<commit_message>
update documentation and presentation and remove unnecessary files
</commit_message>
<xml_diff>
--- a/presentation/Drug Target affinity.pptx
+++ b/presentation/Drug Target affinity.pptx
@@ -5,7 +5,7 @@
     <p:sldMasterId id="2147483708" r:id="rId1"/>
   </p:sldMasterIdLst>
   <p:notesMasterIdLst>
-    <p:notesMasterId r:id="rId36"/>
+    <p:notesMasterId r:id="rId42"/>
   </p:notesMasterIdLst>
   <p:sldIdLst>
     <p:sldId id="256" r:id="rId2"/>
@@ -24,24 +24,30 @@
     <p:sldId id="272" r:id="rId15"/>
     <p:sldId id="270" r:id="rId16"/>
     <p:sldId id="273" r:id="rId17"/>
-    <p:sldId id="292" r:id="rId18"/>
-    <p:sldId id="264" r:id="rId19"/>
-    <p:sldId id="288" r:id="rId20"/>
-    <p:sldId id="289" r:id="rId21"/>
-    <p:sldId id="274" r:id="rId22"/>
-    <p:sldId id="275" r:id="rId23"/>
-    <p:sldId id="277" r:id="rId24"/>
-    <p:sldId id="276" r:id="rId25"/>
-    <p:sldId id="278" r:id="rId26"/>
-    <p:sldId id="279" r:id="rId27"/>
-    <p:sldId id="281" r:id="rId28"/>
-    <p:sldId id="280" r:id="rId29"/>
-    <p:sldId id="283" r:id="rId30"/>
-    <p:sldId id="284" r:id="rId31"/>
-    <p:sldId id="285" r:id="rId32"/>
-    <p:sldId id="286" r:id="rId33"/>
-    <p:sldId id="282" r:id="rId34"/>
-    <p:sldId id="287" r:id="rId35"/>
+    <p:sldId id="293" r:id="rId18"/>
+    <p:sldId id="294" r:id="rId19"/>
+    <p:sldId id="292" r:id="rId20"/>
+    <p:sldId id="264" r:id="rId21"/>
+    <p:sldId id="288" r:id="rId22"/>
+    <p:sldId id="289" r:id="rId23"/>
+    <p:sldId id="295" r:id="rId24"/>
+    <p:sldId id="296" r:id="rId25"/>
+    <p:sldId id="297" r:id="rId26"/>
+    <p:sldId id="298" r:id="rId27"/>
+    <p:sldId id="274" r:id="rId28"/>
+    <p:sldId id="275" r:id="rId29"/>
+    <p:sldId id="277" r:id="rId30"/>
+    <p:sldId id="276" r:id="rId31"/>
+    <p:sldId id="278" r:id="rId32"/>
+    <p:sldId id="279" r:id="rId33"/>
+    <p:sldId id="281" r:id="rId34"/>
+    <p:sldId id="280" r:id="rId35"/>
+    <p:sldId id="283" r:id="rId36"/>
+    <p:sldId id="284" r:id="rId37"/>
+    <p:sldId id="285" r:id="rId38"/>
+    <p:sldId id="286" r:id="rId39"/>
+    <p:sldId id="282" r:id="rId40"/>
+    <p:sldId id="287" r:id="rId41"/>
   </p:sldIdLst>
   <p:sldSz cx="9144000" cy="6858000" type="screen4x3"/>
   <p:notesSz cx="6858000" cy="9144000"/>
@@ -225,7 +231,7 @@
           <a:p>
             <a:fld id="{8EF0DE39-7A54-47F9-AEA5-5AC06FD683AA}" type="datetimeFigureOut">
               <a:rPr lang="en-US" smtClean="0"/>
-              <a:t>8/21/2024</a:t>
+              <a:t>9/4/2024</a:t>
             </a:fld>
             <a:endParaRPr lang="en-US"/>
           </a:p>
@@ -1262,7 +1268,7 @@
           <a:p>
             <a:fld id="{C7689D65-4FEA-4151-83A2-DE7BE828DF61}" type="slidenum">
               <a:rPr lang="en-US" smtClean="0"/>
-              <a:t>17</a:t>
+              <a:t>19</a:t>
             </a:fld>
             <a:endParaRPr lang="en-US"/>
           </a:p>
@@ -1350,7 +1356,7 @@
           <a:p>
             <a:fld id="{C7689D65-4FEA-4151-83A2-DE7BE828DF61}" type="slidenum">
               <a:rPr lang="en-US" smtClean="0"/>
-              <a:t>18</a:t>
+              <a:t>20</a:t>
             </a:fld>
             <a:endParaRPr lang="en-US"/>
           </a:p>
@@ -1446,7 +1452,7 @@
           <a:p>
             <a:fld id="{C7689D65-4FEA-4151-83A2-DE7BE828DF61}" type="slidenum">
               <a:rPr lang="en-US" smtClean="0"/>
-              <a:t>19</a:t>
+              <a:t>21</a:t>
             </a:fld>
             <a:endParaRPr lang="en-US"/>
           </a:p>
@@ -1556,7 +1562,7 @@
           <a:p>
             <a:fld id="{C7689D65-4FEA-4151-83A2-DE7BE828DF61}" type="slidenum">
               <a:rPr lang="en-US" smtClean="0"/>
-              <a:t>20</a:t>
+              <a:t>22</a:t>
             </a:fld>
             <a:endParaRPr lang="en-US"/>
           </a:p>
@@ -1753,7 +1759,7 @@
           <a:p>
             <a:fld id="{C7689D65-4FEA-4151-83A2-DE7BE828DF61}" type="slidenum">
               <a:rPr lang="en-US" smtClean="0"/>
-              <a:t>34</a:t>
+              <a:t>40</a:t>
             </a:fld>
             <a:endParaRPr lang="en-US"/>
           </a:p>
@@ -5566,7 +5572,7 @@
             <a:fld id="{1D8BD707-D9CF-40AE-B4C6-C98DA3205C09}" type="datetimeFigureOut">
               <a:rPr lang="en-US" smtClean="0"/>
               <a:pPr/>
-              <a:t>8/21/2024</a:t>
+              <a:t>9/4/2024</a:t>
             </a:fld>
             <a:endParaRPr lang="en-US"/>
           </a:p>
@@ -5764,7 +5770,7 @@
             <a:fld id="{1D8BD707-D9CF-40AE-B4C6-C98DA3205C09}" type="datetimeFigureOut">
               <a:rPr lang="en-US" smtClean="0"/>
               <a:pPr/>
-              <a:t>8/21/2024</a:t>
+              <a:t>9/4/2024</a:t>
             </a:fld>
             <a:endParaRPr lang="en-US"/>
           </a:p>
@@ -5951,7 +5957,7 @@
             <a:fld id="{1D8BD707-D9CF-40AE-B4C6-C98DA3205C09}" type="datetimeFigureOut">
               <a:rPr lang="en-US" smtClean="0"/>
               <a:pPr/>
-              <a:t>8/21/2024</a:t>
+              <a:t>9/4/2024</a:t>
             </a:fld>
             <a:endParaRPr lang="en-US"/>
           </a:p>
@@ -6103,7 +6109,7 @@
             <a:fld id="{1D8BD707-D9CF-40AE-B4C6-C98DA3205C09}" type="datetimeFigureOut">
               <a:rPr lang="en-US" smtClean="0"/>
               <a:pPr/>
-              <a:t>8/21/2024</a:t>
+              <a:t>9/4/2024</a:t>
             </a:fld>
             <a:endParaRPr lang="en-US"/>
           </a:p>
@@ -6360,7 +6366,7 @@
             <a:fld id="{1D8BD707-D9CF-40AE-B4C6-C98DA3205C09}" type="datetimeFigureOut">
               <a:rPr lang="en-US" smtClean="0"/>
               <a:pPr/>
-              <a:t>8/21/2024</a:t>
+              <a:t>9/4/2024</a:t>
             </a:fld>
             <a:endParaRPr lang="en-US"/>
           </a:p>
@@ -6771,7 +6777,7 @@
             <a:fld id="{1D8BD707-D9CF-40AE-B4C6-C98DA3205C09}" type="datetimeFigureOut">
               <a:rPr lang="en-US" smtClean="0"/>
               <a:pPr/>
-              <a:t>8/21/2024</a:t>
+              <a:t>9/4/2024</a:t>
             </a:fld>
             <a:endParaRPr lang="en-US"/>
           </a:p>
@@ -7219,7 +7225,7 @@
             <a:fld id="{1D8BD707-D9CF-40AE-B4C6-C98DA3205C09}" type="datetimeFigureOut">
               <a:rPr lang="en-US" smtClean="0"/>
               <a:pPr/>
-              <a:t>8/21/2024</a:t>
+              <a:t>9/4/2024</a:t>
             </a:fld>
             <a:endParaRPr lang="en-US"/>
           </a:p>
@@ -7322,7 +7328,7 @@
             <a:fld id="{1D8BD707-D9CF-40AE-B4C6-C98DA3205C09}" type="datetimeFigureOut">
               <a:rPr lang="en-US" smtClean="0"/>
               <a:pPr/>
-              <a:t>8/21/2024</a:t>
+              <a:t>9/4/2024</a:t>
             </a:fld>
             <a:endParaRPr lang="en-US"/>
           </a:p>
@@ -7445,7 +7451,7 @@
             <a:fld id="{1D8BD707-D9CF-40AE-B4C6-C98DA3205C09}" type="datetimeFigureOut">
               <a:rPr lang="en-US" smtClean="0"/>
               <a:pPr/>
-              <a:t>8/21/2024</a:t>
+              <a:t>9/4/2024</a:t>
             </a:fld>
             <a:endParaRPr lang="en-US"/>
           </a:p>
@@ -7721,7 +7727,7 @@
             <a:fld id="{1D8BD707-D9CF-40AE-B4C6-C98DA3205C09}" type="datetimeFigureOut">
               <a:rPr lang="en-US" smtClean="0"/>
               <a:pPr/>
-              <a:t>8/21/2024</a:t>
+              <a:t>9/4/2024</a:t>
             </a:fld>
             <a:endParaRPr lang="en-US"/>
           </a:p>
@@ -7928,7 +7934,7 @@
             <a:fld id="{1D8BD707-D9CF-40AE-B4C6-C98DA3205C09}" type="datetimeFigureOut">
               <a:rPr lang="en-US" smtClean="0"/>
               <a:pPr/>
-              <a:t>8/21/2024</a:t>
+              <a:t>9/4/2024</a:t>
             </a:fld>
             <a:endParaRPr lang="en-US"/>
           </a:p>
@@ -9039,7 +9045,7 @@
             <a:fld id="{1D8BD707-D9CF-40AE-B4C6-C98DA3205C09}" type="datetimeFigureOut">
               <a:rPr lang="en-US" smtClean="0"/>
               <a:pPr/>
-              <a:t>8/21/2024</a:t>
+              <a:t>9/4/2024</a:t>
             </a:fld>
             <a:endParaRPr lang="en-US"/>
           </a:p>
@@ -10948,7 +10954,19 @@
             </a:r>
             <a:r>
               <a:rPr lang="en-US" dirty="0"/>
-              <a:t>% of which have affinity values of 10000 </a:t>
+              <a:t>% of which have affinity values of </a:t>
+            </a:r>
+            <a:r>
+              <a:rPr lang="en-US" b="1" dirty="0" err="1" smtClean="0"/>
+              <a:t>Kd</a:t>
+            </a:r>
+            <a:r>
+              <a:rPr lang="en-US" b="1" dirty="0" smtClean="0"/>
+              <a:t> = </a:t>
+            </a:r>
+            <a:r>
+              <a:rPr lang="en-US" dirty="0" smtClean="0"/>
+              <a:t>10000 </a:t>
             </a:r>
             <a:r>
               <a:rPr lang="en-US" dirty="0" err="1"/>
@@ -11345,7 +11363,15 @@
             <a:pPr lvl="1"/>
             <a:r>
               <a:rPr lang="en-US" dirty="0"/>
-              <a:t>measured as KIBA scores and ranging from 0.0 to </a:t>
+              <a:t>measured as </a:t>
+            </a:r>
+            <a:r>
+              <a:rPr lang="en-US" b="1" dirty="0"/>
+              <a:t>KIBA scores</a:t>
+            </a:r>
+            <a:r>
+              <a:rPr lang="en-US" dirty="0"/>
+              <a:t> and ranging from 0.0 to </a:t>
             </a:r>
             <a:r>
               <a:rPr lang="en-US" dirty="0" smtClean="0"/>
@@ -11531,6 +11557,299 @@
         </p:nvSpPr>
         <p:spPr>
           <a:xfrm>
+            <a:off x="457200" y="1143000"/>
+            <a:ext cx="8229600" cy="5257800"/>
+          </a:xfrm>
+        </p:spPr>
+        <p:txBody>
+          <a:bodyPr>
+            <a:normAutofit fontScale="92500" lnSpcReduction="10000"/>
+          </a:bodyPr>
+          <a:lstStyle/>
+          <a:p>
+            <a:r>
+              <a:rPr lang="en-US" dirty="0"/>
+              <a:t>In URV-May-2024 database, the URV systematically collected all structures from the Protein Data Bank(PDB) [11] containing the SARS-CoV-2 </a:t>
+            </a:r>
+            <a:r>
+              <a:rPr lang="en-US" dirty="0" err="1"/>
+              <a:t>Mpro</a:t>
+            </a:r>
+            <a:r>
+              <a:rPr lang="en-US" dirty="0"/>
+              <a:t> protein - also known as the main protease or 3CL protease, is </a:t>
+            </a:r>
+            <a:r>
+              <a:rPr lang="en-US" dirty="0" smtClean="0"/>
+              <a:t>a key </a:t>
+            </a:r>
+            <a:r>
+              <a:rPr lang="en-US" dirty="0"/>
+              <a:t>enzyme in the replication and transcription of the SARS-CoV-2 virus, which causes </a:t>
+            </a:r>
+            <a:r>
+              <a:rPr lang="en-US" dirty="0" smtClean="0"/>
+              <a:t>COVID-19. </a:t>
+            </a:r>
+          </a:p>
+          <a:p>
+            <a:r>
+              <a:rPr lang="en-US" dirty="0" smtClean="0"/>
+              <a:t>Dataset </a:t>
+            </a:r>
+            <a:r>
+              <a:rPr lang="en-US" smtClean="0"/>
+              <a:t>was refined </a:t>
+            </a:r>
+            <a:r>
+              <a:rPr lang="en-US" dirty="0"/>
+              <a:t>by </a:t>
+            </a:r>
+            <a:r>
+              <a:rPr lang="en-US" dirty="0" smtClean="0"/>
+              <a:t>selecting structures </a:t>
+            </a:r>
+            <a:r>
+              <a:rPr lang="en-US" dirty="0"/>
+              <a:t>with available IC50 values from </a:t>
+            </a:r>
+            <a:r>
+              <a:rPr lang="en-US" dirty="0" err="1"/>
+              <a:t>ChEMBL</a:t>
+            </a:r>
+            <a:r>
+              <a:rPr lang="en-US" dirty="0"/>
+              <a:t> [12] and </a:t>
+            </a:r>
+            <a:r>
+              <a:rPr lang="en-US" dirty="0" err="1"/>
+              <a:t>BindingDB</a:t>
+            </a:r>
+            <a:r>
+              <a:rPr lang="en-US" dirty="0"/>
+              <a:t> [13] databases, resulting in a </a:t>
+            </a:r>
+            <a:r>
+              <a:rPr lang="en-US" dirty="0" smtClean="0"/>
+              <a:t>final set </a:t>
+            </a:r>
+            <a:r>
+              <a:rPr lang="en-US" dirty="0"/>
+              <a:t>of 233 structures. For each structure, we obtained the inhibitor’s structure in SDF format, the protein-inhibitor complex in PDB format, and the corresponding IC50 value for </a:t>
+            </a:r>
+            <a:r>
+              <a:rPr lang="en-US" dirty="0" err="1"/>
+              <a:t>Mpro</a:t>
+            </a:r>
+            <a:r>
+              <a:rPr lang="en-US" dirty="0"/>
+              <a:t> inhibition. </a:t>
+            </a:r>
+          </a:p>
+        </p:txBody>
+      </p:sp>
+      <p:sp>
+        <p:nvSpPr>
+          <p:cNvPr id="3" name="Title 2"/>
+          <p:cNvSpPr>
+            <a:spLocks noGrp="1"/>
+          </p:cNvSpPr>
+          <p:nvPr>
+            <p:ph type="title"/>
+          </p:nvPr>
+        </p:nvSpPr>
+        <p:spPr/>
+        <p:txBody>
+          <a:bodyPr/>
+          <a:lstStyle/>
+          <a:p>
+            <a:r>
+              <a:rPr lang="en-US" dirty="0"/>
+              <a:t>Datasets</a:t>
+            </a:r>
+          </a:p>
+        </p:txBody>
+      </p:sp>
+    </p:spTree>
+    <p:extLst>
+      <p:ext uri="{BB962C8B-B14F-4D97-AF65-F5344CB8AC3E}">
+        <p14:creationId xmlns:p14="http://schemas.microsoft.com/office/powerpoint/2010/main" val="1214098601"/>
+      </p:ext>
+    </p:extLst>
+  </p:cSld>
+  <p:clrMapOvr>
+    <a:masterClrMapping/>
+  </p:clrMapOvr>
+</p:sld>
+</file>
+
+<file path=ppt/slides/slide18.xml><?xml version="1.0" encoding="utf-8"?>
+<p:sld xmlns:a="http://schemas.openxmlformats.org/drawingml/2006/main" xmlns:r="http://schemas.openxmlformats.org/officeDocument/2006/relationships" xmlns:p="http://schemas.openxmlformats.org/presentationml/2006/main">
+  <p:cSld>
+    <p:spTree>
+      <p:nvGrpSpPr>
+        <p:cNvPr id="1" name=""/>
+        <p:cNvGrpSpPr/>
+        <p:nvPr/>
+      </p:nvGrpSpPr>
+      <p:grpSpPr>
+        <a:xfrm>
+          <a:off x="0" y="0"/>
+          <a:ext cx="0" cy="0"/>
+          <a:chOff x="0" y="0"/>
+          <a:chExt cx="0" cy="0"/>
+        </a:xfrm>
+      </p:grpSpPr>
+      <p:sp>
+        <p:nvSpPr>
+          <p:cNvPr id="2" name="Content Placeholder 1"/>
+          <p:cNvSpPr>
+            <a:spLocks noGrp="1"/>
+          </p:cNvSpPr>
+          <p:nvPr>
+            <p:ph idx="1"/>
+          </p:nvPr>
+        </p:nvSpPr>
+        <p:spPr/>
+        <p:txBody>
+          <a:bodyPr/>
+          <a:lstStyle/>
+          <a:p>
+            <a:r>
+              <a:rPr lang="en-US" dirty="0"/>
+              <a:t>IC50 represents the concentration of inhibitor required to inhibit 50% of enzyme activity. Additionally, we transformed IC50 values into pIC50, the negative logarithm (base 10) of the IC50 value, where a higher pIC50 value indicates a more potent inhibitor.</a:t>
+            </a:r>
+          </a:p>
+        </p:txBody>
+      </p:sp>
+      <p:sp>
+        <p:nvSpPr>
+          <p:cNvPr id="3" name="Title 2"/>
+          <p:cNvSpPr>
+            <a:spLocks noGrp="1"/>
+          </p:cNvSpPr>
+          <p:nvPr>
+            <p:ph type="title"/>
+          </p:nvPr>
+        </p:nvSpPr>
+        <p:spPr/>
+        <p:txBody>
+          <a:bodyPr/>
+          <a:lstStyle/>
+          <a:p>
+            <a:r>
+              <a:rPr lang="en-US" dirty="0"/>
+              <a:t>Datasets</a:t>
+            </a:r>
+          </a:p>
+        </p:txBody>
+      </p:sp>
+      <p:pic>
+        <p:nvPicPr>
+          <p:cNvPr id="1026" name="Picture 2"/>
+          <p:cNvPicPr>
+            <a:picLocks noChangeAspect="1" noChangeArrowheads="1"/>
+          </p:cNvPicPr>
+          <p:nvPr/>
+        </p:nvPicPr>
+        <p:blipFill>
+          <a:blip r:embed="rId2">
+            <a:extLst>
+              <a:ext uri="{28A0092B-C50C-407E-A947-70E740481C1C}">
+                <a14:useLocalDpi xmlns:a14="http://schemas.microsoft.com/office/drawing/2010/main" val="0"/>
+              </a:ext>
+            </a:extLst>
+          </a:blip>
+          <a:srcRect/>
+          <a:stretch>
+            <a:fillRect/>
+          </a:stretch>
+        </p:blipFill>
+        <p:spPr bwMode="auto">
+          <a:xfrm>
+            <a:off x="5334000" y="3950756"/>
+            <a:ext cx="3590925" cy="2907244"/>
+          </a:xfrm>
+          <a:prstGeom prst="rect">
+            <a:avLst/>
+          </a:prstGeom>
+          <a:noFill/>
+          <a:ln>
+            <a:noFill/>
+          </a:ln>
+          <a:effectLst/>
+          <a:extLst>
+            <a:ext uri="{909E8E84-426E-40DD-AFC4-6F175D3DCCD1}">
+              <a14:hiddenFill xmlns:a14="http://schemas.microsoft.com/office/drawing/2010/main">
+                <a:solidFill>
+                  <a:schemeClr val="accent1"/>
+                </a:solidFill>
+              </a14:hiddenFill>
+            </a:ext>
+            <a:ext uri="{91240B29-F687-4F45-9708-019B960494DF}">
+              <a14:hiddenLine xmlns:a14="http://schemas.microsoft.com/office/drawing/2010/main" w="9525">
+                <a:solidFill>
+                  <a:schemeClr val="tx1"/>
+                </a:solidFill>
+                <a:miter lim="800000"/>
+                <a:headEnd/>
+                <a:tailEnd/>
+              </a14:hiddenLine>
+            </a:ext>
+            <a:ext uri="{AF507438-7753-43E0-B8FC-AC1667EBCBE1}">
+              <a14:hiddenEffects xmlns:a14="http://schemas.microsoft.com/office/drawing/2010/main">
+                <a:effectLst>
+                  <a:outerShdw dist="35921" dir="2700000" algn="ctr" rotWithShape="0">
+                    <a:schemeClr val="bg2"/>
+                  </a:outerShdw>
+                </a:effectLst>
+              </a14:hiddenEffects>
+            </a:ext>
+          </a:extLst>
+        </p:spPr>
+      </p:pic>
+    </p:spTree>
+    <p:extLst>
+      <p:ext uri="{BB962C8B-B14F-4D97-AF65-F5344CB8AC3E}">
+        <p14:creationId xmlns:p14="http://schemas.microsoft.com/office/powerpoint/2010/main" val="1401925372"/>
+      </p:ext>
+    </p:extLst>
+  </p:cSld>
+  <p:clrMapOvr>
+    <a:masterClrMapping/>
+  </p:clrMapOvr>
+</p:sld>
+</file>
+
+<file path=ppt/slides/slide19.xml><?xml version="1.0" encoding="utf-8"?>
+<p:sld xmlns:a="http://schemas.openxmlformats.org/drawingml/2006/main" xmlns:r="http://schemas.openxmlformats.org/officeDocument/2006/relationships" xmlns:p="http://schemas.openxmlformats.org/presentationml/2006/main">
+  <p:cSld>
+    <p:spTree>
+      <p:nvGrpSpPr>
+        <p:cNvPr id="1" name=""/>
+        <p:cNvGrpSpPr/>
+        <p:nvPr/>
+      </p:nvGrpSpPr>
+      <p:grpSpPr>
+        <a:xfrm>
+          <a:off x="0" y="0"/>
+          <a:ext cx="0" cy="0"/>
+          <a:chOff x="0" y="0"/>
+          <a:chExt cx="0" cy="0"/>
+        </a:xfrm>
+      </p:grpSpPr>
+      <p:sp>
+        <p:nvSpPr>
+          <p:cNvPr id="2" name="Content Placeholder 1"/>
+          <p:cNvSpPr>
+            <a:spLocks noGrp="1"/>
+          </p:cNvSpPr>
+          <p:nvPr>
+            <p:ph idx="1"/>
+          </p:nvPr>
+        </p:nvSpPr>
+        <p:spPr>
+          <a:xfrm>
             <a:off x="152400" y="990600"/>
             <a:ext cx="8991600" cy="5715000"/>
           </a:xfrm>
@@ -11712,7 +12031,128 @@
 </p:sld>
 </file>
 
-<file path=ppt/slides/slide18.xml><?xml version="1.0" encoding="utf-8"?>
+<file path=ppt/slides/slide2.xml><?xml version="1.0" encoding="utf-8"?>
+<p:sld xmlns:a="http://schemas.openxmlformats.org/drawingml/2006/main" xmlns:r="http://schemas.openxmlformats.org/officeDocument/2006/relationships" xmlns:p="http://schemas.openxmlformats.org/presentationml/2006/main">
+  <p:cSld>
+    <p:spTree>
+      <p:nvGrpSpPr>
+        <p:cNvPr id="1" name=""/>
+        <p:cNvGrpSpPr/>
+        <p:nvPr/>
+      </p:nvGrpSpPr>
+      <p:grpSpPr>
+        <a:xfrm>
+          <a:off x="0" y="0"/>
+          <a:ext cx="0" cy="0"/>
+          <a:chOff x="0" y="0"/>
+          <a:chExt cx="0" cy="0"/>
+        </a:xfrm>
+      </p:grpSpPr>
+      <p:sp>
+        <p:nvSpPr>
+          <p:cNvPr id="2" name="Content Placeholder 1"/>
+          <p:cNvSpPr>
+            <a:spLocks noGrp="1"/>
+          </p:cNvSpPr>
+          <p:nvPr>
+            <p:ph idx="1"/>
+          </p:nvPr>
+        </p:nvSpPr>
+        <p:spPr/>
+        <p:txBody>
+          <a:bodyPr/>
+          <a:lstStyle/>
+          <a:p>
+            <a:r>
+              <a:rPr lang="en-US" dirty="0" smtClean="0"/>
+              <a:t>Introduction to Drug Target Affinity(DTA) </a:t>
+            </a:r>
+          </a:p>
+          <a:p>
+            <a:r>
+              <a:rPr lang="en-US" dirty="0" smtClean="0"/>
+              <a:t>Drug and Protein representation </a:t>
+            </a:r>
+          </a:p>
+          <a:p>
+            <a:r>
+              <a:rPr lang="en-US" dirty="0" smtClean="0"/>
+              <a:t>Affinity measurements</a:t>
+            </a:r>
+          </a:p>
+          <a:p>
+            <a:r>
+              <a:rPr lang="en-US" dirty="0" smtClean="0"/>
+              <a:t>Datasets</a:t>
+            </a:r>
+          </a:p>
+          <a:p>
+            <a:r>
+              <a:rPr lang="en-US" dirty="0" smtClean="0"/>
+              <a:t>Previous work</a:t>
+            </a:r>
+          </a:p>
+          <a:p>
+            <a:r>
+              <a:rPr lang="en-US" dirty="0" err="1" smtClean="0"/>
+              <a:t>GraphDTA</a:t>
+            </a:r>
+            <a:r>
+              <a:rPr lang="en-US" dirty="0" smtClean="0"/>
+              <a:t> paper overview</a:t>
+            </a:r>
+          </a:p>
+          <a:p>
+            <a:r>
+              <a:rPr lang="en-US" dirty="0" smtClean="0"/>
+              <a:t>Results</a:t>
+            </a:r>
+          </a:p>
+          <a:p>
+            <a:endParaRPr lang="en-US" dirty="0" smtClean="0"/>
+          </a:p>
+          <a:p>
+            <a:endParaRPr lang="en-US" dirty="0"/>
+          </a:p>
+        </p:txBody>
+      </p:sp>
+      <p:sp>
+        <p:nvSpPr>
+          <p:cNvPr id="3" name="Title 2"/>
+          <p:cNvSpPr>
+            <a:spLocks noGrp="1"/>
+          </p:cNvSpPr>
+          <p:nvPr>
+            <p:ph type="title"/>
+          </p:nvPr>
+        </p:nvSpPr>
+        <p:spPr/>
+        <p:txBody>
+          <a:bodyPr/>
+          <a:lstStyle/>
+          <a:p>
+            <a:r>
+              <a:rPr lang="en-US" dirty="0" smtClean="0"/>
+              <a:t>Contents</a:t>
+            </a:r>
+            <a:endParaRPr lang="en-US" dirty="0"/>
+          </a:p>
+        </p:txBody>
+      </p:sp>
+    </p:spTree>
+    <p:extLst>
+      <p:ext uri="{BB962C8B-B14F-4D97-AF65-F5344CB8AC3E}">
+        <p14:creationId xmlns:p14="http://schemas.microsoft.com/office/powerpoint/2010/main" val="3181001702"/>
+      </p:ext>
+    </p:extLst>
+  </p:cSld>
+  <p:clrMapOvr>
+    <a:masterClrMapping/>
+  </p:clrMapOvr>
+</p:sld>
+</file>
+
+<file path=ppt/slides/slide20.xml><?xml version="1.0" encoding="utf-8"?>
 <p:sld xmlns:a="http://schemas.openxmlformats.org/drawingml/2006/main" xmlns:r="http://schemas.openxmlformats.org/officeDocument/2006/relationships" xmlns:p="http://schemas.openxmlformats.org/presentationml/2006/main">
   <p:cSld>
     <p:spTree>
@@ -12099,7 +12539,7 @@
 </p:sld>
 </file>
 
-<file path=ppt/slides/slide19.xml><?xml version="1.0" encoding="utf-8"?>
+<file path=ppt/slides/slide21.xml><?xml version="1.0" encoding="utf-8"?>
 <p:sld xmlns:a="http://schemas.openxmlformats.org/drawingml/2006/main" xmlns:r="http://schemas.openxmlformats.org/officeDocument/2006/relationships" xmlns:p="http://schemas.openxmlformats.org/presentationml/2006/main">
   <p:cSld>
     <p:spTree>
@@ -12184,7 +12624,7 @@
             <a:pPr lvl="1"/>
             <a:r>
               <a:rPr lang="en-US" dirty="0" smtClean="0"/>
-              <a:t>4 models</a:t>
+              <a:t>4 variant models</a:t>
             </a:r>
           </a:p>
           <a:p>
@@ -12212,13 +12652,13 @@
       </p:sp>
       <p:pic>
         <p:nvPicPr>
-          <p:cNvPr id="1029" name="Picture 5"/>
+          <p:cNvPr id="2" name="Picture 1"/>
           <p:cNvPicPr>
-            <a:picLocks noChangeAspect="1" noChangeArrowheads="1"/>
+            <a:picLocks noChangeAspect="1"/>
           </p:cNvPicPr>
           <p:nvPr/>
         </p:nvPicPr>
-        <p:blipFill>
+        <p:blipFill rotWithShape="1">
           <a:blip r:embed="rId3">
             <a:extLst>
               <a:ext uri="{28A0092B-C50C-407E-A947-70E740481C1C}">
@@ -12226,52 +12666,17 @@
               </a:ext>
             </a:extLst>
           </a:blip>
-          <a:srcRect/>
-          <a:stretch>
-            <a:fillRect/>
-          </a:stretch>
+          <a:srcRect l="18310"/>
+          <a:stretch/>
         </p:blipFill>
-        <p:spPr bwMode="auto">
+        <p:spPr>
           <a:xfrm>
-            <a:off x="3733800" y="1469284"/>
-            <a:ext cx="5349616" cy="4779115"/>
+            <a:off x="4077004" y="1143000"/>
+            <a:ext cx="4914593" cy="5295900"/>
           </a:xfrm>
           <a:prstGeom prst="rect">
             <a:avLst/>
           </a:prstGeom>
-          <a:noFill/>
-          <a:ln>
-            <a:noFill/>
-          </a:ln>
-          <a:effectLst/>
-          <a:extLst>
-            <a:ext uri="{909E8E84-426E-40DD-AFC4-6F175D3DCCD1}">
-              <a14:hiddenFill xmlns:a14="http://schemas.microsoft.com/office/drawing/2010/main">
-                <a:solidFill>
-                  <a:schemeClr val="accent1"/>
-                </a:solidFill>
-              </a14:hiddenFill>
-            </a:ext>
-            <a:ext uri="{91240B29-F687-4F45-9708-019B960494DF}">
-              <a14:hiddenLine xmlns:a14="http://schemas.microsoft.com/office/drawing/2010/main" w="9525">
-                <a:solidFill>
-                  <a:schemeClr val="tx1"/>
-                </a:solidFill>
-                <a:miter lim="800000"/>
-                <a:headEnd/>
-                <a:tailEnd/>
-              </a14:hiddenLine>
-            </a:ext>
-            <a:ext uri="{AF507438-7753-43E0-B8FC-AC1667EBCBE1}">
-              <a14:hiddenEffects xmlns:a14="http://schemas.microsoft.com/office/drawing/2010/main">
-                <a:effectLst>
-                  <a:outerShdw dist="35921" dir="2700000" algn="ctr" rotWithShape="0">
-                    <a:schemeClr val="bg2"/>
-                  </a:outerShdw>
-                </a:effectLst>
-              </a14:hiddenEffects>
-            </a:ext>
-          </a:extLst>
         </p:spPr>
       </p:pic>
     </p:spTree>
@@ -12294,7 +12699,7 @@
 </p:sld>
 </file>
 
-<file path=ppt/slides/slide2.xml><?xml version="1.0" encoding="utf-8"?>
+<file path=ppt/slides/slide22.xml><?xml version="1.0" encoding="utf-8"?>
 <p:sld xmlns:a="http://schemas.openxmlformats.org/drawingml/2006/main" xmlns:r="http://schemas.openxmlformats.org/officeDocument/2006/relationships" xmlns:p="http://schemas.openxmlformats.org/presentationml/2006/main">
   <p:cSld>
     <p:spTree>
@@ -12313,130 +12718,6 @@
       </p:grpSpPr>
       <p:sp>
         <p:nvSpPr>
-          <p:cNvPr id="2" name="Content Placeholder 1"/>
-          <p:cNvSpPr>
-            <a:spLocks noGrp="1"/>
-          </p:cNvSpPr>
-          <p:nvPr>
-            <p:ph idx="1"/>
-          </p:nvPr>
-        </p:nvSpPr>
-        <p:spPr/>
-        <p:txBody>
-          <a:bodyPr/>
-          <a:lstStyle/>
-          <a:p>
-            <a:r>
-              <a:rPr lang="en-US" dirty="0" smtClean="0"/>
-              <a:t>Introduction to Drug Target Affinity(DTA) </a:t>
-            </a:r>
-            <a:endParaRPr lang="en-US" dirty="0" smtClean="0"/>
-          </a:p>
-          <a:p>
-            <a:r>
-              <a:rPr lang="en-US" dirty="0" smtClean="0"/>
-              <a:t>Drug and Protein representation </a:t>
-            </a:r>
-            <a:endParaRPr lang="en-US" dirty="0" smtClean="0"/>
-          </a:p>
-          <a:p>
-            <a:r>
-              <a:rPr lang="en-US" dirty="0" smtClean="0"/>
-              <a:t>Affinity measurements</a:t>
-            </a:r>
-          </a:p>
-          <a:p>
-            <a:r>
-              <a:rPr lang="en-US" dirty="0" smtClean="0"/>
-              <a:t>Datasets</a:t>
-            </a:r>
-          </a:p>
-          <a:p>
-            <a:r>
-              <a:rPr lang="en-US" dirty="0" smtClean="0"/>
-              <a:t>Previous work</a:t>
-            </a:r>
-          </a:p>
-          <a:p>
-            <a:r>
-              <a:rPr lang="en-US" dirty="0" err="1" smtClean="0"/>
-              <a:t>GraphDTA</a:t>
-            </a:r>
-            <a:r>
-              <a:rPr lang="en-US" dirty="0" smtClean="0"/>
-              <a:t> paper overview</a:t>
-            </a:r>
-            <a:endParaRPr lang="en-US" dirty="0" smtClean="0"/>
-          </a:p>
-          <a:p>
-            <a:r>
-              <a:rPr lang="en-US" dirty="0" smtClean="0"/>
-              <a:t>Results</a:t>
-            </a:r>
-          </a:p>
-          <a:p>
-            <a:endParaRPr lang="en-US" dirty="0" smtClean="0"/>
-          </a:p>
-          <a:p>
-            <a:endParaRPr lang="en-US" dirty="0"/>
-          </a:p>
-        </p:txBody>
-      </p:sp>
-      <p:sp>
-        <p:nvSpPr>
-          <p:cNvPr id="3" name="Title 2"/>
-          <p:cNvSpPr>
-            <a:spLocks noGrp="1"/>
-          </p:cNvSpPr>
-          <p:nvPr>
-            <p:ph type="title"/>
-          </p:nvPr>
-        </p:nvSpPr>
-        <p:spPr/>
-        <p:txBody>
-          <a:bodyPr/>
-          <a:lstStyle/>
-          <a:p>
-            <a:r>
-              <a:rPr lang="en-US" dirty="0" smtClean="0"/>
-              <a:t>Contents</a:t>
-            </a:r>
-            <a:endParaRPr lang="en-US" dirty="0"/>
-          </a:p>
-        </p:txBody>
-      </p:sp>
-    </p:spTree>
-    <p:extLst>
-      <p:ext uri="{BB962C8B-B14F-4D97-AF65-F5344CB8AC3E}">
-        <p14:creationId xmlns:p14="http://schemas.microsoft.com/office/powerpoint/2010/main" val="3181001702"/>
-      </p:ext>
-    </p:extLst>
-  </p:cSld>
-  <p:clrMapOvr>
-    <a:masterClrMapping/>
-  </p:clrMapOvr>
-</p:sld>
-</file>
-
-<file path=ppt/slides/slide20.xml><?xml version="1.0" encoding="utf-8"?>
-<p:sld xmlns:a="http://schemas.openxmlformats.org/drawingml/2006/main" xmlns:r="http://schemas.openxmlformats.org/officeDocument/2006/relationships" xmlns:p="http://schemas.openxmlformats.org/presentationml/2006/main">
-  <p:cSld>
-    <p:spTree>
-      <p:nvGrpSpPr>
-        <p:cNvPr id="1" name=""/>
-        <p:cNvGrpSpPr/>
-        <p:nvPr/>
-      </p:nvGrpSpPr>
-      <p:grpSpPr>
-        <a:xfrm>
-          <a:off x="0" y="0"/>
-          <a:ext cx="0" cy="0"/>
-          <a:chOff x="0" y="0"/>
-          <a:chExt cx="0" cy="0"/>
-        </a:xfrm>
-      </p:grpSpPr>
-      <p:sp>
-        <p:nvSpPr>
           <p:cNvPr id="3" name="Title 2"/>
           <p:cNvSpPr>
             <a:spLocks noGrp="1"/>
@@ -12477,36 +12758,17 @@
         </p:nvSpPr>
         <p:spPr>
           <a:xfrm>
-            <a:off x="152400" y="914400"/>
-            <a:ext cx="8610600" cy="5562600"/>
+            <a:off x="152399" y="914400"/>
+            <a:ext cx="8899315" cy="5562600"/>
           </a:xfrm>
         </p:spPr>
         <p:txBody>
           <a:bodyPr/>
           <a:lstStyle/>
           <a:p>
-            <a:r>
-              <a:rPr lang="en-US" dirty="0" smtClean="0"/>
-              <a:t>Label encoding </a:t>
-            </a:r>
-            <a:r>
-              <a:rPr lang="en-US" dirty="0"/>
-              <a:t>[e.g. Alanine (A) is 1, </a:t>
-            </a:r>
-            <a:r>
-              <a:rPr lang="en-US" dirty="0" err="1"/>
-              <a:t>Cystine</a:t>
-            </a:r>
-            <a:r>
-              <a:rPr lang="en-US" dirty="0"/>
-              <a:t> (C) is 3, Aspartic Acid (D) is 4 and so on</a:t>
-            </a:r>
-            <a:r>
-              <a:rPr lang="en-US" dirty="0" smtClean="0"/>
-              <a:t>]</a:t>
-            </a:r>
-          </a:p>
-          <a:p>
+            <a:pPr marL="109728" indent="0">
+              <a:buNone/>
+            </a:pPr>
             <a:r>
               <a:rPr lang="en-US" dirty="0" smtClean="0"/>
               <a:t> </a:t>
@@ -12517,14 +12779,14 @@
       </p:sp>
       <p:pic>
         <p:nvPicPr>
-          <p:cNvPr id="9" name="Picture 5"/>
+          <p:cNvPr id="2" name="Picture 2" descr="C:\Users\pc\AppData\Local\Packages\Microsoft.Windows.Photos_8wekyb3d8bbwe\TempState\ShareServiceTempFolder\Protein branch.drawio.jpeg"/>
           <p:cNvPicPr>
             <a:picLocks noChangeAspect="1" noChangeArrowheads="1"/>
           </p:cNvPicPr>
           <p:nvPr/>
         </p:nvPicPr>
         <p:blipFill>
-          <a:blip r:embed="rId3" cstate="print">
+          <a:blip r:embed="rId3">
             <a:extLst>
               <a:ext uri="{28A0092B-C50C-407E-A947-70E740481C1C}">
                 <a14:useLocalDpi xmlns:a14="http://schemas.microsoft.com/office/drawing/2010/main" val="0"/>
@@ -12538,47 +12800,54 @@
         </p:blipFill>
         <p:spPr bwMode="auto">
           <a:xfrm>
-            <a:off x="6620204" y="4103143"/>
-            <a:ext cx="2362200" cy="2110287"/>
+            <a:off x="304800" y="838201"/>
+            <a:ext cx="6150061" cy="5971784"/>
           </a:xfrm>
           <a:prstGeom prst="rect">
             <a:avLst/>
           </a:prstGeom>
           <a:noFill/>
-          <a:ln>
-            <a:noFill/>
-          </a:ln>
-          <a:effectLst/>
           <a:extLst>
             <a:ext uri="{909E8E84-426E-40DD-AFC4-6F175D3DCCD1}">
               <a14:hiddenFill xmlns:a14="http://schemas.microsoft.com/office/drawing/2010/main">
                 <a:solidFill>
-                  <a:schemeClr val="accent1"/>
+                  <a:srgbClr val="FFFFFF"/>
                 </a:solidFill>
               </a14:hiddenFill>
-            </a:ext>
-            <a:ext uri="{91240B29-F687-4F45-9708-019B960494DF}">
-              <a14:hiddenLine xmlns:a14="http://schemas.microsoft.com/office/drawing/2010/main" w="9525">
-                <a:solidFill>
-                  <a:schemeClr val="tx1"/>
-                </a:solidFill>
-                <a:miter lim="800000"/>
-                <a:headEnd/>
-                <a:tailEnd/>
-              </a14:hiddenLine>
-            </a:ext>
-            <a:ext uri="{AF507438-7753-43E0-B8FC-AC1667EBCBE1}">
-              <a14:hiddenEffects xmlns:a14="http://schemas.microsoft.com/office/drawing/2010/main">
-                <a:effectLst>
-                  <a:outerShdw dist="35921" dir="2700000" algn="ctr" rotWithShape="0">
-                    <a:schemeClr val="bg2"/>
-                  </a:outerShdw>
-                </a:effectLst>
-              </a14:hiddenEffects>
             </a:ext>
           </a:extLst>
         </p:spPr>
       </p:pic>
+      <p:pic>
+        <p:nvPicPr>
+          <p:cNvPr id="4" name="Picture 3"/>
+          <p:cNvPicPr>
+            <a:picLocks noChangeAspect="1"/>
+          </p:cNvPicPr>
+          <p:nvPr/>
+        </p:nvPicPr>
+        <p:blipFill>
+          <a:blip r:embed="rId4" cstate="print">
+            <a:extLst>
+              <a:ext uri="{28A0092B-C50C-407E-A947-70E740481C1C}">
+                <a14:useLocalDpi xmlns:a14="http://schemas.microsoft.com/office/drawing/2010/main" val="0"/>
+              </a:ext>
+            </a:extLst>
+          </a:blip>
+          <a:stretch>
+            <a:fillRect/>
+          </a:stretch>
+        </p:blipFill>
+        <p:spPr>
+          <a:xfrm>
+            <a:off x="6428538" y="4404533"/>
+            <a:ext cx="2596854" cy="1889933"/>
+          </a:xfrm>
+          <a:prstGeom prst="rect">
+            <a:avLst/>
+          </a:prstGeom>
+        </p:spPr>
+      </p:pic>
       <p:sp>
         <p:nvSpPr>
           <p:cNvPr id="10" name="Rectangle 9"/>
@@ -12587,8 +12856,8 @@
         </p:nvSpPr>
         <p:spPr>
           <a:xfrm>
-            <a:off x="8382000" y="4724400"/>
-            <a:ext cx="600404" cy="1489030"/>
+            <a:off x="8424988" y="5181600"/>
+            <a:ext cx="600404" cy="914400"/>
           </a:xfrm>
           <a:prstGeom prst="rect">
             <a:avLst/>
@@ -12645,7 +12914,827 @@
 </p:sld>
 </file>
 
-<file path=ppt/slides/slide21.xml><?xml version="1.0" encoding="utf-8"?>
+<file path=ppt/slides/slide23.xml><?xml version="1.0" encoding="utf-8"?>
+<p:sld xmlns:a="http://schemas.openxmlformats.org/drawingml/2006/main" xmlns:r="http://schemas.openxmlformats.org/officeDocument/2006/relationships" xmlns:p="http://schemas.openxmlformats.org/presentationml/2006/main">
+  <p:cSld>
+    <p:spTree>
+      <p:nvGrpSpPr>
+        <p:cNvPr id="1" name=""/>
+        <p:cNvGrpSpPr/>
+        <p:nvPr/>
+      </p:nvGrpSpPr>
+      <p:grpSpPr>
+        <a:xfrm>
+          <a:off x="0" y="0"/>
+          <a:ext cx="0" cy="0"/>
+          <a:chOff x="0" y="0"/>
+          <a:chExt cx="0" cy="0"/>
+        </a:xfrm>
+      </p:grpSpPr>
+      <p:sp>
+        <p:nvSpPr>
+          <p:cNvPr id="2" name="Content Placeholder 1"/>
+          <p:cNvSpPr>
+            <a:spLocks noGrp="1"/>
+          </p:cNvSpPr>
+          <p:nvPr>
+            <p:ph idx="1"/>
+          </p:nvPr>
+        </p:nvSpPr>
+        <p:spPr>
+          <a:xfrm>
+            <a:off x="0" y="1143000"/>
+            <a:ext cx="9144000" cy="5562600"/>
+          </a:xfrm>
+        </p:spPr>
+        <p:txBody>
+          <a:bodyPr>
+            <a:normAutofit lnSpcReduction="10000"/>
+          </a:bodyPr>
+          <a:lstStyle/>
+          <a:p>
+            <a:r>
+              <a:rPr lang="en-US" dirty="0" smtClean="0"/>
+              <a:t>GCN model</a:t>
+            </a:r>
+          </a:p>
+          <a:p>
+            <a:pPr lvl="1"/>
+            <a:r>
+              <a:rPr lang="en-US" sz="2000" dirty="0"/>
+              <a:t>graph convolutional operator from the </a:t>
+            </a:r>
+            <a:r>
+              <a:rPr lang="en-US" sz="2000" dirty="0">
+                <a:hlinkClick r:id="rId2"/>
+              </a:rPr>
+              <a:t>“Semi-supervised Classification with Graph Convolutional Networks”</a:t>
+            </a:r>
+            <a:r>
+              <a:rPr lang="en-US" sz="2000" dirty="0"/>
+              <a:t> </a:t>
+            </a:r>
+            <a:r>
+              <a:rPr lang="en-US" sz="2000" dirty="0" smtClean="0"/>
+              <a:t>paper in 2017.</a:t>
+            </a:r>
+            <a:endParaRPr lang="en-US" sz="2000" dirty="0"/>
+          </a:p>
+          <a:p>
+            <a:pPr lvl="1"/>
+            <a:r>
+              <a:rPr lang="en-US" sz="2000" dirty="0" smtClean="0"/>
+              <a:t>Implemented in </a:t>
+            </a:r>
+            <a:r>
+              <a:rPr lang="en-US" sz="2000" dirty="0" err="1" smtClean="0"/>
+              <a:t>torch_geometric</a:t>
+            </a:r>
+            <a:r>
+              <a:rPr lang="en-US" sz="2000" dirty="0" smtClean="0"/>
+              <a:t> as </a:t>
+            </a:r>
+            <a:r>
+              <a:rPr lang="en-US" sz="2000" b="1" dirty="0" err="1" smtClean="0"/>
+              <a:t>GCNConv</a:t>
+            </a:r>
+            <a:endParaRPr lang="en-US" sz="2000" b="1" dirty="0" smtClean="0"/>
+          </a:p>
+          <a:p>
+            <a:pPr lvl="1"/>
+            <a:endParaRPr lang="en-US" b="1" dirty="0"/>
+          </a:p>
+          <a:p>
+            <a:pPr lvl="1"/>
+            <a:endParaRPr lang="en-US" b="1" dirty="0" smtClean="0"/>
+          </a:p>
+          <a:p>
+            <a:pPr lvl="1"/>
+            <a:endParaRPr lang="en-US" b="1" dirty="0" smtClean="0"/>
+          </a:p>
+          <a:p>
+            <a:pPr lvl="1"/>
+            <a:endParaRPr lang="en-US" b="1" dirty="0" smtClean="0"/>
+          </a:p>
+          <a:p>
+            <a:pPr lvl="1"/>
+            <a:endParaRPr lang="en-US" b="1" dirty="0"/>
+          </a:p>
+          <a:p>
+            <a:pPr lvl="2"/>
+            <a:endParaRPr lang="en-US" dirty="0" smtClean="0"/>
+          </a:p>
+          <a:p>
+            <a:pPr lvl="2"/>
+            <a:r>
+              <a:rPr lang="en-US" b="1" dirty="0" smtClean="0"/>
+              <a:t>A</a:t>
+            </a:r>
+            <a:r>
+              <a:rPr lang="en-US" dirty="0" smtClean="0"/>
+              <a:t> is </a:t>
+            </a:r>
+            <a:r>
+              <a:rPr lang="en-US" dirty="0"/>
+              <a:t>the </a:t>
+            </a:r>
+            <a:r>
+              <a:rPr lang="en-US" dirty="0" smtClean="0"/>
+              <a:t>normalized adjacency </a:t>
+            </a:r>
+            <a:r>
+              <a:rPr lang="en-US" dirty="0"/>
+              <a:t>matrix </a:t>
+            </a:r>
+            <a:r>
+              <a:rPr lang="en-US" b="1" dirty="0" smtClean="0"/>
+              <a:t>N * N</a:t>
+            </a:r>
+          </a:p>
+          <a:p>
+            <a:pPr lvl="2"/>
+            <a:r>
+              <a:rPr lang="en-US" b="1" dirty="0" smtClean="0"/>
+              <a:t>X</a:t>
+            </a:r>
+            <a:r>
+              <a:rPr lang="en-US" dirty="0" smtClean="0"/>
+              <a:t> is node feature matrix </a:t>
+            </a:r>
+            <a:r>
+              <a:rPr lang="en-US" b="1" dirty="0"/>
+              <a:t>N * </a:t>
+            </a:r>
+            <a:r>
+              <a:rPr lang="en-US" b="1" dirty="0" smtClean="0"/>
+              <a:t>C</a:t>
+            </a:r>
+          </a:p>
+          <a:p>
+            <a:pPr lvl="2"/>
+            <a:r>
+              <a:rPr lang="en-US" b="1" dirty="0" smtClean="0"/>
+              <a:t>W </a:t>
+            </a:r>
+            <a:r>
+              <a:rPr lang="en-US" dirty="0" smtClean="0"/>
+              <a:t>weight matrix of size </a:t>
+            </a:r>
+            <a:r>
+              <a:rPr lang="en-US" b="1" dirty="0" smtClean="0"/>
+              <a:t>C * F</a:t>
+            </a:r>
+          </a:p>
+          <a:p>
+            <a:pPr lvl="2"/>
+            <a:r>
+              <a:rPr lang="en-US" b="1" dirty="0" smtClean="0"/>
+              <a:t>Z </a:t>
+            </a:r>
+            <a:r>
+              <a:rPr lang="en-US" dirty="0"/>
+              <a:t>node-level </a:t>
+            </a:r>
+            <a:r>
+              <a:rPr lang="en-US" dirty="0" smtClean="0"/>
+              <a:t>output matrix </a:t>
+            </a:r>
+            <a:r>
+              <a:rPr lang="en-US" b="1" dirty="0" smtClean="0"/>
+              <a:t>N </a:t>
+            </a:r>
+            <a:r>
+              <a:rPr lang="en-US" b="1" dirty="0"/>
+              <a:t>* </a:t>
+            </a:r>
+            <a:r>
+              <a:rPr lang="en-US" b="1" dirty="0" smtClean="0"/>
+              <a:t>F</a:t>
+            </a:r>
+            <a:endParaRPr lang="en-US" b="1" dirty="0"/>
+          </a:p>
+          <a:p>
+            <a:pPr marL="630936" lvl="2" indent="0">
+              <a:buNone/>
+            </a:pPr>
+            <a:r>
+              <a:rPr lang="en-US" dirty="0" smtClean="0"/>
+              <a:t/>
+            </a:r>
+            <a:br>
+              <a:rPr lang="en-US" dirty="0" smtClean="0"/>
+            </a:br>
+            <a:endParaRPr lang="en-US" dirty="0"/>
+          </a:p>
+        </p:txBody>
+      </p:sp>
+      <p:sp>
+        <p:nvSpPr>
+          <p:cNvPr id="3" name="Title 2"/>
+          <p:cNvSpPr>
+            <a:spLocks noGrp="1"/>
+          </p:cNvSpPr>
+          <p:nvPr>
+            <p:ph type="title"/>
+          </p:nvPr>
+        </p:nvSpPr>
+        <p:spPr>
+          <a:xfrm>
+            <a:off x="457200" y="274638"/>
+            <a:ext cx="8229600" cy="715962"/>
+          </a:xfrm>
+        </p:spPr>
+        <p:txBody>
+          <a:bodyPr>
+            <a:normAutofit fontScale="90000"/>
+          </a:bodyPr>
+          <a:lstStyle/>
+          <a:p>
+            <a:r>
+              <a:rPr lang="en-US" dirty="0" smtClean="0"/>
+              <a:t>Drug Branch</a:t>
+            </a:r>
+            <a:endParaRPr lang="en-US" dirty="0"/>
+          </a:p>
+        </p:txBody>
+      </p:sp>
+      <p:pic>
+        <p:nvPicPr>
+          <p:cNvPr id="5" name="Picture 4"/>
+          <p:cNvPicPr>
+            <a:picLocks noChangeAspect="1"/>
+          </p:cNvPicPr>
+          <p:nvPr/>
+        </p:nvPicPr>
+        <p:blipFill>
+          <a:blip r:embed="rId3">
+            <a:extLst>
+              <a:ext uri="{28A0092B-C50C-407E-A947-70E740481C1C}">
+                <a14:useLocalDpi xmlns:a14="http://schemas.microsoft.com/office/drawing/2010/main" val="0"/>
+              </a:ext>
+            </a:extLst>
+          </a:blip>
+          <a:stretch>
+            <a:fillRect/>
+          </a:stretch>
+        </p:blipFill>
+        <p:spPr>
+          <a:xfrm>
+            <a:off x="838200" y="2438399"/>
+            <a:ext cx="7981950" cy="2181225"/>
+          </a:xfrm>
+          <a:prstGeom prst="rect">
+            <a:avLst/>
+          </a:prstGeom>
+        </p:spPr>
+      </p:pic>
+    </p:spTree>
+    <p:extLst>
+      <p:ext uri="{BB962C8B-B14F-4D97-AF65-F5344CB8AC3E}">
+        <p14:creationId xmlns:p14="http://schemas.microsoft.com/office/powerpoint/2010/main" val="244176943"/>
+      </p:ext>
+    </p:extLst>
+  </p:cSld>
+  <p:clrMapOvr>
+    <a:masterClrMapping/>
+  </p:clrMapOvr>
+  <p:timing>
+    <p:tnLst>
+      <p:par>
+        <p:cTn id="1" dur="indefinite" restart="never" nodeType="tmRoot"/>
+      </p:par>
+    </p:tnLst>
+  </p:timing>
+</p:sld>
+</file>
+
+<file path=ppt/slides/slide24.xml><?xml version="1.0" encoding="utf-8"?>
+<p:sld xmlns:a="http://schemas.openxmlformats.org/drawingml/2006/main" xmlns:r="http://schemas.openxmlformats.org/officeDocument/2006/relationships" xmlns:p="http://schemas.openxmlformats.org/presentationml/2006/main">
+  <p:cSld>
+    <p:spTree>
+      <p:nvGrpSpPr>
+        <p:cNvPr id="1" name=""/>
+        <p:cNvGrpSpPr/>
+        <p:nvPr/>
+      </p:nvGrpSpPr>
+      <p:grpSpPr>
+        <a:xfrm>
+          <a:off x="0" y="0"/>
+          <a:ext cx="0" cy="0"/>
+          <a:chOff x="0" y="0"/>
+          <a:chExt cx="0" cy="0"/>
+        </a:xfrm>
+      </p:grpSpPr>
+      <p:sp>
+        <p:nvSpPr>
+          <p:cNvPr id="2" name="Content Placeholder 1"/>
+          <p:cNvSpPr>
+            <a:spLocks noGrp="1"/>
+          </p:cNvSpPr>
+          <p:nvPr>
+            <p:ph idx="1"/>
+          </p:nvPr>
+        </p:nvSpPr>
+        <p:spPr>
+          <a:xfrm>
+            <a:off x="457200" y="838200"/>
+            <a:ext cx="8458200" cy="5867400"/>
+          </a:xfrm>
+        </p:spPr>
+        <p:txBody>
+          <a:bodyPr/>
+          <a:lstStyle/>
+          <a:p>
+            <a:r>
+              <a:rPr lang="en-US" dirty="0" smtClean="0"/>
+              <a:t>GCN-based </a:t>
+            </a:r>
+            <a:r>
+              <a:rPr lang="en-US" dirty="0"/>
+              <a:t>model</a:t>
+            </a:r>
+          </a:p>
+          <a:p>
+            <a:pPr lvl="1"/>
+            <a:endParaRPr lang="en-US" dirty="0"/>
+          </a:p>
+        </p:txBody>
+      </p:sp>
+      <p:sp>
+        <p:nvSpPr>
+          <p:cNvPr id="3" name="Title 2"/>
+          <p:cNvSpPr>
+            <a:spLocks noGrp="1"/>
+          </p:cNvSpPr>
+          <p:nvPr>
+            <p:ph type="title"/>
+          </p:nvPr>
+        </p:nvSpPr>
+        <p:spPr>
+          <a:xfrm>
+            <a:off x="457200" y="274638"/>
+            <a:ext cx="8229600" cy="563562"/>
+          </a:xfrm>
+        </p:spPr>
+        <p:txBody>
+          <a:bodyPr>
+            <a:normAutofit fontScale="90000"/>
+          </a:bodyPr>
+          <a:lstStyle/>
+          <a:p>
+            <a:r>
+              <a:rPr lang="en-US" dirty="0"/>
+              <a:t>Drug Branch</a:t>
+            </a:r>
+          </a:p>
+        </p:txBody>
+      </p:sp>
+      <p:pic>
+        <p:nvPicPr>
+          <p:cNvPr id="4" name="Picture 3"/>
+          <p:cNvPicPr>
+            <a:picLocks noChangeAspect="1"/>
+          </p:cNvPicPr>
+          <p:nvPr/>
+        </p:nvPicPr>
+        <p:blipFill>
+          <a:blip r:embed="rId2" cstate="print">
+            <a:extLst>
+              <a:ext uri="{28A0092B-C50C-407E-A947-70E740481C1C}">
+                <a14:useLocalDpi xmlns:a14="http://schemas.microsoft.com/office/drawing/2010/main" val="0"/>
+              </a:ext>
+            </a:extLst>
+          </a:blip>
+          <a:stretch>
+            <a:fillRect/>
+          </a:stretch>
+        </p:blipFill>
+        <p:spPr>
+          <a:xfrm>
+            <a:off x="6934200" y="4538339"/>
+            <a:ext cx="2133600" cy="2107353"/>
+          </a:xfrm>
+          <a:prstGeom prst="rect">
+            <a:avLst/>
+          </a:prstGeom>
+        </p:spPr>
+      </p:pic>
+      <p:sp>
+        <p:nvSpPr>
+          <p:cNvPr id="6" name="Rectangle 5"/>
+          <p:cNvSpPr/>
+          <p:nvPr/>
+        </p:nvSpPr>
+        <p:spPr>
+          <a:xfrm>
+            <a:off x="7315200" y="5410200"/>
+            <a:ext cx="838200" cy="539307"/>
+          </a:xfrm>
+          <a:prstGeom prst="rect">
+            <a:avLst/>
+          </a:prstGeom>
+          <a:noFill/>
+          <a:ln>
+            <a:solidFill>
+              <a:srgbClr val="FF0000"/>
+            </a:solidFill>
+          </a:ln>
+        </p:spPr>
+        <p:style>
+          <a:lnRef idx="2">
+            <a:schemeClr val="accent1">
+              <a:shade val="50000"/>
+            </a:schemeClr>
+          </a:lnRef>
+          <a:fillRef idx="1">
+            <a:schemeClr val="accent1"/>
+          </a:fillRef>
+          <a:effectRef idx="0">
+            <a:schemeClr val="accent1"/>
+          </a:effectRef>
+          <a:fontRef idx="minor">
+            <a:schemeClr val="lt1"/>
+          </a:fontRef>
+        </p:style>
+        <p:txBody>
+          <a:bodyPr rtlCol="0" anchor="ctr"/>
+          <a:lstStyle/>
+          <a:p>
+            <a:pPr algn="ctr"/>
+            <a:endParaRPr lang="en-US"/>
+          </a:p>
+        </p:txBody>
+      </p:sp>
+      <p:pic>
+        <p:nvPicPr>
+          <p:cNvPr id="7" name="Picture 6"/>
+          <p:cNvPicPr>
+            <a:picLocks noChangeAspect="1"/>
+          </p:cNvPicPr>
+          <p:nvPr/>
+        </p:nvPicPr>
+        <p:blipFill>
+          <a:blip r:embed="rId3">
+            <a:extLst>
+              <a:ext uri="{28A0092B-C50C-407E-A947-70E740481C1C}">
+                <a14:useLocalDpi xmlns:a14="http://schemas.microsoft.com/office/drawing/2010/main" val="0"/>
+              </a:ext>
+            </a:extLst>
+          </a:blip>
+          <a:stretch>
+            <a:fillRect/>
+          </a:stretch>
+        </p:blipFill>
+        <p:spPr>
+          <a:xfrm>
+            <a:off x="2438400" y="1295400"/>
+            <a:ext cx="4300297" cy="5105401"/>
+          </a:xfrm>
+          <a:prstGeom prst="rect">
+            <a:avLst/>
+          </a:prstGeom>
+        </p:spPr>
+      </p:pic>
+    </p:spTree>
+    <p:extLst>
+      <p:ext uri="{BB962C8B-B14F-4D97-AF65-F5344CB8AC3E}">
+        <p14:creationId xmlns:p14="http://schemas.microsoft.com/office/powerpoint/2010/main" val="611543730"/>
+      </p:ext>
+    </p:extLst>
+  </p:cSld>
+  <p:clrMapOvr>
+    <a:masterClrMapping/>
+  </p:clrMapOvr>
+  <p:timing>
+    <p:tnLst>
+      <p:par>
+        <p:cTn id="1" dur="indefinite" restart="never" nodeType="tmRoot"/>
+      </p:par>
+    </p:tnLst>
+  </p:timing>
+</p:sld>
+</file>
+
+<file path=ppt/slides/slide25.xml><?xml version="1.0" encoding="utf-8"?>
+<p:sld xmlns:a="http://schemas.openxmlformats.org/drawingml/2006/main" xmlns:r="http://schemas.openxmlformats.org/officeDocument/2006/relationships" xmlns:p="http://schemas.openxmlformats.org/presentationml/2006/main">
+  <p:cSld>
+    <p:spTree>
+      <p:nvGrpSpPr>
+        <p:cNvPr id="1" name=""/>
+        <p:cNvGrpSpPr/>
+        <p:nvPr/>
+      </p:nvGrpSpPr>
+      <p:grpSpPr>
+        <a:xfrm>
+          <a:off x="0" y="0"/>
+          <a:ext cx="0" cy="0"/>
+          <a:chOff x="0" y="0"/>
+          <a:chExt cx="0" cy="0"/>
+        </a:xfrm>
+      </p:grpSpPr>
+      <p:pic>
+        <p:nvPicPr>
+          <p:cNvPr id="6" name="Content Placeholder 5"/>
+          <p:cNvPicPr>
+            <a:picLocks noGrp="1" noChangeAspect="1"/>
+          </p:cNvPicPr>
+          <p:nvPr>
+            <p:ph idx="1"/>
+          </p:nvPr>
+        </p:nvPicPr>
+        <p:blipFill>
+          <a:blip r:embed="rId2">
+            <a:extLst>
+              <a:ext uri="{28A0092B-C50C-407E-A947-70E740481C1C}">
+                <a14:useLocalDpi xmlns:a14="http://schemas.microsoft.com/office/drawing/2010/main" val="0"/>
+              </a:ext>
+            </a:extLst>
+          </a:blip>
+          <a:stretch>
+            <a:fillRect/>
+          </a:stretch>
+        </p:blipFill>
+        <p:spPr>
+          <a:xfrm>
+            <a:off x="2514600" y="900449"/>
+            <a:ext cx="3686153" cy="5595601"/>
+          </a:xfrm>
+        </p:spPr>
+      </p:pic>
+      <p:sp>
+        <p:nvSpPr>
+          <p:cNvPr id="3" name="Title 2"/>
+          <p:cNvSpPr>
+            <a:spLocks noGrp="1"/>
+          </p:cNvSpPr>
+          <p:nvPr>
+            <p:ph type="title"/>
+          </p:nvPr>
+        </p:nvSpPr>
+        <p:spPr>
+          <a:xfrm>
+            <a:off x="457200" y="274638"/>
+            <a:ext cx="8229600" cy="715962"/>
+          </a:xfrm>
+        </p:spPr>
+        <p:txBody>
+          <a:bodyPr>
+            <a:normAutofit fontScale="90000"/>
+          </a:bodyPr>
+          <a:lstStyle/>
+          <a:p>
+            <a:r>
+              <a:rPr lang="en-US" dirty="0" smtClean="0"/>
+              <a:t>Combined fully connected layers</a:t>
+            </a:r>
+            <a:endParaRPr lang="en-US" dirty="0"/>
+          </a:p>
+        </p:txBody>
+      </p:sp>
+      <p:pic>
+        <p:nvPicPr>
+          <p:cNvPr id="4" name="Picture 3"/>
+          <p:cNvPicPr>
+            <a:picLocks noChangeAspect="1"/>
+          </p:cNvPicPr>
+          <p:nvPr/>
+        </p:nvPicPr>
+        <p:blipFill>
+          <a:blip r:embed="rId3" cstate="print">
+            <a:extLst>
+              <a:ext uri="{28A0092B-C50C-407E-A947-70E740481C1C}">
+                <a14:useLocalDpi xmlns:a14="http://schemas.microsoft.com/office/drawing/2010/main" val="0"/>
+              </a:ext>
+            </a:extLst>
+          </a:blip>
+          <a:stretch>
+            <a:fillRect/>
+          </a:stretch>
+        </p:blipFill>
+        <p:spPr>
+          <a:xfrm>
+            <a:off x="6200753" y="3886200"/>
+            <a:ext cx="2562247" cy="2530727"/>
+          </a:xfrm>
+          <a:prstGeom prst="rect">
+            <a:avLst/>
+          </a:prstGeom>
+        </p:spPr>
+      </p:pic>
+      <p:sp>
+        <p:nvSpPr>
+          <p:cNvPr id="5" name="Rectangle 4"/>
+          <p:cNvSpPr/>
+          <p:nvPr/>
+        </p:nvSpPr>
+        <p:spPr>
+          <a:xfrm>
+            <a:off x="7481876" y="4063185"/>
+            <a:ext cx="525780" cy="368708"/>
+          </a:xfrm>
+          <a:prstGeom prst="rect">
+            <a:avLst/>
+          </a:prstGeom>
+          <a:noFill/>
+          <a:ln>
+            <a:solidFill>
+              <a:srgbClr val="FF0000"/>
+            </a:solidFill>
+          </a:ln>
+        </p:spPr>
+        <p:style>
+          <a:lnRef idx="2">
+            <a:schemeClr val="accent1">
+              <a:shade val="50000"/>
+            </a:schemeClr>
+          </a:lnRef>
+          <a:fillRef idx="1">
+            <a:schemeClr val="accent1"/>
+          </a:fillRef>
+          <a:effectRef idx="0">
+            <a:schemeClr val="accent1"/>
+          </a:effectRef>
+          <a:fontRef idx="minor">
+            <a:schemeClr val="lt1"/>
+          </a:fontRef>
+        </p:style>
+        <p:txBody>
+          <a:bodyPr rtlCol="0" anchor="ctr"/>
+          <a:lstStyle/>
+          <a:p>
+            <a:pPr algn="ctr"/>
+            <a:endParaRPr lang="en-US"/>
+          </a:p>
+        </p:txBody>
+      </p:sp>
+    </p:spTree>
+    <p:extLst>
+      <p:ext uri="{BB962C8B-B14F-4D97-AF65-F5344CB8AC3E}">
+        <p14:creationId xmlns:p14="http://schemas.microsoft.com/office/powerpoint/2010/main" val="1294960955"/>
+      </p:ext>
+    </p:extLst>
+  </p:cSld>
+  <p:clrMapOvr>
+    <a:masterClrMapping/>
+  </p:clrMapOvr>
+</p:sld>
+</file>
+
+<file path=ppt/slides/slide26.xml><?xml version="1.0" encoding="utf-8"?>
+<p:sld xmlns:a="http://schemas.openxmlformats.org/drawingml/2006/main" xmlns:r="http://schemas.openxmlformats.org/officeDocument/2006/relationships" xmlns:p="http://schemas.openxmlformats.org/presentationml/2006/main">
+  <p:cSld>
+    <p:spTree>
+      <p:nvGrpSpPr>
+        <p:cNvPr id="1" name=""/>
+        <p:cNvGrpSpPr/>
+        <p:nvPr/>
+      </p:nvGrpSpPr>
+      <p:grpSpPr>
+        <a:xfrm>
+          <a:off x="0" y="0"/>
+          <a:ext cx="0" cy="0"/>
+          <a:chOff x="0" y="0"/>
+          <a:chExt cx="0" cy="0"/>
+        </a:xfrm>
+      </p:grpSpPr>
+      <p:sp>
+        <p:nvSpPr>
+          <p:cNvPr id="2" name="Content Placeholder 1"/>
+          <p:cNvSpPr>
+            <a:spLocks noGrp="1"/>
+          </p:cNvSpPr>
+          <p:nvPr>
+            <p:ph idx="1"/>
+          </p:nvPr>
+        </p:nvSpPr>
+        <p:spPr>
+          <a:xfrm>
+            <a:off x="457200" y="1295400"/>
+            <a:ext cx="8229600" cy="4711891"/>
+          </a:xfrm>
+        </p:spPr>
+        <p:txBody>
+          <a:bodyPr/>
+          <a:lstStyle/>
+          <a:p>
+            <a:r>
+              <a:rPr lang="en-US" dirty="0" smtClean="0"/>
+              <a:t>Fork the </a:t>
+            </a:r>
+            <a:r>
+              <a:rPr lang="en-US" dirty="0" err="1" smtClean="0"/>
+              <a:t>GraphDTA</a:t>
+            </a:r>
+            <a:r>
+              <a:rPr lang="en-US" dirty="0"/>
+              <a:t> </a:t>
+            </a:r>
+            <a:r>
+              <a:rPr lang="en-US" dirty="0" smtClean="0"/>
+              <a:t>code repository</a:t>
+            </a:r>
+          </a:p>
+          <a:p>
+            <a:r>
+              <a:rPr lang="en-US" dirty="0" smtClean="0"/>
+              <a:t>Refactor </a:t>
+            </a:r>
+            <a:r>
+              <a:rPr lang="en-US" dirty="0"/>
+              <a:t>the </a:t>
+            </a:r>
+            <a:r>
+              <a:rPr lang="en-US" dirty="0" smtClean="0"/>
+              <a:t>code</a:t>
+            </a:r>
+          </a:p>
+          <a:p>
+            <a:r>
+              <a:rPr lang="en-US" dirty="0" smtClean="0"/>
+              <a:t>Train the given 4 models on 3 datasets </a:t>
+            </a:r>
+          </a:p>
+          <a:p>
+            <a:r>
+              <a:rPr lang="en-US" dirty="0" smtClean="0"/>
+              <a:t>Plot and compare the resulting MSEs  </a:t>
+            </a:r>
+            <a:endParaRPr lang="en-US" dirty="0"/>
+          </a:p>
+        </p:txBody>
+      </p:sp>
+      <p:sp>
+        <p:nvSpPr>
+          <p:cNvPr id="3" name="Title 2"/>
+          <p:cNvSpPr>
+            <a:spLocks noGrp="1"/>
+          </p:cNvSpPr>
+          <p:nvPr>
+            <p:ph type="title"/>
+          </p:nvPr>
+        </p:nvSpPr>
+        <p:spPr>
+          <a:xfrm>
+            <a:off x="457200" y="274638"/>
+            <a:ext cx="8229600" cy="944562"/>
+          </a:xfrm>
+        </p:spPr>
+        <p:txBody>
+          <a:bodyPr/>
+          <a:lstStyle/>
+          <a:p>
+            <a:r>
+              <a:rPr lang="en-US" dirty="0" smtClean="0"/>
+              <a:t>Contribution</a:t>
+            </a:r>
+            <a:endParaRPr lang="en-US" dirty="0"/>
+          </a:p>
+        </p:txBody>
+      </p:sp>
+      <p:pic>
+        <p:nvPicPr>
+          <p:cNvPr id="4" name="Picture 3"/>
+          <p:cNvPicPr>
+            <a:picLocks noChangeAspect="1"/>
+          </p:cNvPicPr>
+          <p:nvPr/>
+        </p:nvPicPr>
+        <p:blipFill>
+          <a:blip r:embed="rId2">
+            <a:extLst>
+              <a:ext uri="{28A0092B-C50C-407E-A947-70E740481C1C}">
+                <a14:useLocalDpi xmlns:a14="http://schemas.microsoft.com/office/drawing/2010/main" val="0"/>
+              </a:ext>
+            </a:extLst>
+          </a:blip>
+          <a:stretch>
+            <a:fillRect/>
+          </a:stretch>
+        </p:blipFill>
+        <p:spPr>
+          <a:xfrm>
+            <a:off x="3914914" y="3392289"/>
+            <a:ext cx="4553727" cy="1295400"/>
+          </a:xfrm>
+          <a:prstGeom prst="rect">
+            <a:avLst/>
+          </a:prstGeom>
+        </p:spPr>
+      </p:pic>
+    </p:spTree>
+    <p:extLst>
+      <p:ext uri="{BB962C8B-B14F-4D97-AF65-F5344CB8AC3E}">
+        <p14:creationId xmlns:p14="http://schemas.microsoft.com/office/powerpoint/2010/main" val="2153724261"/>
+      </p:ext>
+    </p:extLst>
+  </p:cSld>
+  <p:clrMapOvr>
+    <a:masterClrMapping/>
+  </p:clrMapOvr>
+</p:sld>
+</file>
+
+<file path=ppt/slides/slide27.xml><?xml version="1.0" encoding="utf-8"?>
 <p:sld xmlns:a="http://schemas.openxmlformats.org/drawingml/2006/main" xmlns:r="http://schemas.openxmlformats.org/officeDocument/2006/relationships" xmlns:p="http://schemas.openxmlformats.org/presentationml/2006/main">
   <p:cSld>
     <p:spTree>
@@ -12889,7 +13978,7 @@
 </p:sld>
 </file>
 
-<file path=ppt/slides/slide22.xml><?xml version="1.0" encoding="utf-8"?>
+<file path=ppt/slides/slide28.xml><?xml version="1.0" encoding="utf-8"?>
 <p:sld xmlns:a="http://schemas.openxmlformats.org/drawingml/2006/main" xmlns:r="http://schemas.openxmlformats.org/officeDocument/2006/relationships" xmlns:p="http://schemas.openxmlformats.org/presentationml/2006/main">
   <p:cSld>
     <p:spTree>
@@ -13133,7 +14222,7 @@
 </p:sld>
 </file>
 
-<file path=ppt/slides/slide23.xml><?xml version="1.0" encoding="utf-8"?>
+<file path=ppt/slides/slide29.xml><?xml version="1.0" encoding="utf-8"?>
 <p:sld xmlns:a="http://schemas.openxmlformats.org/drawingml/2006/main" xmlns:r="http://schemas.openxmlformats.org/officeDocument/2006/relationships" xmlns:p="http://schemas.openxmlformats.org/presentationml/2006/main">
   <p:cSld>
     <p:spTree>
@@ -13377,7 +14466,114 @@
 </p:sld>
 </file>
 
-<file path=ppt/slides/slide24.xml><?xml version="1.0" encoding="utf-8"?>
+<file path=ppt/slides/slide3.xml><?xml version="1.0" encoding="utf-8"?>
+<p:sld xmlns:a="http://schemas.openxmlformats.org/drawingml/2006/main" xmlns:r="http://schemas.openxmlformats.org/officeDocument/2006/relationships" xmlns:p="http://schemas.openxmlformats.org/presentationml/2006/main">
+  <p:cSld>
+    <p:spTree>
+      <p:nvGrpSpPr>
+        <p:cNvPr id="1" name=""/>
+        <p:cNvGrpSpPr/>
+        <p:nvPr/>
+      </p:nvGrpSpPr>
+      <p:grpSpPr>
+        <a:xfrm>
+          <a:off x="0" y="0"/>
+          <a:ext cx="0" cy="0"/>
+          <a:chOff x="0" y="0"/>
+          <a:chExt cx="0" cy="0"/>
+        </a:xfrm>
+      </p:grpSpPr>
+      <p:sp>
+        <p:nvSpPr>
+          <p:cNvPr id="2" name="Content Placeholder 1"/>
+          <p:cNvSpPr>
+            <a:spLocks noGrp="1"/>
+          </p:cNvSpPr>
+          <p:nvPr>
+            <p:ph idx="1"/>
+          </p:nvPr>
+        </p:nvSpPr>
+        <p:spPr/>
+        <p:txBody>
+          <a:bodyPr>
+            <a:normAutofit/>
+          </a:bodyPr>
+          <a:lstStyle/>
+          <a:p>
+            <a:r>
+              <a:rPr lang="en-US" dirty="0"/>
+              <a:t>A virus encodes one or more </a:t>
+            </a:r>
+            <a:r>
+              <a:rPr lang="en-US" b="1" dirty="0"/>
+              <a:t>proteases</a:t>
+            </a:r>
+            <a:r>
+              <a:rPr lang="en-US" dirty="0"/>
+              <a:t> which are enzymes that spur the formation of new protein products, thus play crucial roles in virus </a:t>
+            </a:r>
+            <a:r>
+              <a:rPr lang="en-US" dirty="0" smtClean="0"/>
+              <a:t>replication</a:t>
+            </a:r>
+          </a:p>
+          <a:p>
+            <a:r>
+              <a:rPr lang="en-US" b="1" dirty="0"/>
+              <a:t>proteases </a:t>
+            </a:r>
+            <a:r>
+              <a:rPr lang="en-US" dirty="0" smtClean="0"/>
+              <a:t>are </a:t>
+            </a:r>
+            <a:r>
+              <a:rPr lang="en-US" dirty="0"/>
+              <a:t>important targets for the design and development of potent antiviral agents or </a:t>
+            </a:r>
+            <a:r>
+              <a:rPr lang="en-US" b="1" dirty="0" smtClean="0"/>
+              <a:t>drugs</a:t>
+            </a:r>
+          </a:p>
+        </p:txBody>
+      </p:sp>
+      <p:sp>
+        <p:nvSpPr>
+          <p:cNvPr id="3" name="Title 2"/>
+          <p:cNvSpPr>
+            <a:spLocks noGrp="1"/>
+          </p:cNvSpPr>
+          <p:nvPr>
+            <p:ph type="title"/>
+          </p:nvPr>
+        </p:nvSpPr>
+        <p:spPr/>
+        <p:txBody>
+          <a:bodyPr/>
+          <a:lstStyle/>
+          <a:p>
+            <a:r>
+              <a:rPr lang="en-US" dirty="0" smtClean="0"/>
+              <a:t>Introduction</a:t>
+            </a:r>
+            <a:endParaRPr lang="en-US" dirty="0"/>
+          </a:p>
+        </p:txBody>
+      </p:sp>
+    </p:spTree>
+    <p:extLst>
+      <p:ext uri="{BB962C8B-B14F-4D97-AF65-F5344CB8AC3E}">
+        <p14:creationId xmlns:p14="http://schemas.microsoft.com/office/powerpoint/2010/main" val="1428778530"/>
+      </p:ext>
+    </p:extLst>
+  </p:cSld>
+  <p:clrMapOvr>
+    <a:masterClrMapping/>
+  </p:clrMapOvr>
+</p:sld>
+</file>
+
+<file path=ppt/slides/slide30.xml><?xml version="1.0" encoding="utf-8"?>
 <p:sld xmlns:a="http://schemas.openxmlformats.org/drawingml/2006/main" xmlns:r="http://schemas.openxmlformats.org/officeDocument/2006/relationships" xmlns:p="http://schemas.openxmlformats.org/presentationml/2006/main">
   <p:cSld>
     <p:spTree>
@@ -13625,7 +14821,7 @@
 </p:sld>
 </file>
 
-<file path=ppt/slides/slide25.xml><?xml version="1.0" encoding="utf-8"?>
+<file path=ppt/slides/slide31.xml><?xml version="1.0" encoding="utf-8"?>
 <p:sld xmlns:a="http://schemas.openxmlformats.org/drawingml/2006/main" xmlns:r="http://schemas.openxmlformats.org/officeDocument/2006/relationships" xmlns:p="http://schemas.openxmlformats.org/presentationml/2006/main">
   <p:cSld>
     <p:spTree>
@@ -13865,7 +15061,7 @@
 </p:sld>
 </file>
 
-<file path=ppt/slides/slide26.xml><?xml version="1.0" encoding="utf-8"?>
+<file path=ppt/slides/slide32.xml><?xml version="1.0" encoding="utf-8"?>
 <p:sld xmlns:a="http://schemas.openxmlformats.org/drawingml/2006/main" xmlns:r="http://schemas.openxmlformats.org/officeDocument/2006/relationships" xmlns:p="http://schemas.openxmlformats.org/presentationml/2006/main">
   <p:cSld>
     <p:spTree>
@@ -14105,7 +15301,7 @@
 </p:sld>
 </file>
 
-<file path=ppt/slides/slide27.xml><?xml version="1.0" encoding="utf-8"?>
+<file path=ppt/slides/slide33.xml><?xml version="1.0" encoding="utf-8"?>
 <p:sld xmlns:a="http://schemas.openxmlformats.org/drawingml/2006/main" xmlns:r="http://schemas.openxmlformats.org/officeDocument/2006/relationships" xmlns:p="http://schemas.openxmlformats.org/presentationml/2006/main">
   <p:cSld>
     <p:spTree>
@@ -14345,7 +15541,7 @@
 </p:sld>
 </file>
 
-<file path=ppt/slides/slide28.xml><?xml version="1.0" encoding="utf-8"?>
+<file path=ppt/slides/slide34.xml><?xml version="1.0" encoding="utf-8"?>
 <p:sld xmlns:a="http://schemas.openxmlformats.org/drawingml/2006/main" xmlns:r="http://schemas.openxmlformats.org/officeDocument/2006/relationships" xmlns:p="http://schemas.openxmlformats.org/presentationml/2006/main">
   <p:cSld>
     <p:spTree>
@@ -14585,7 +15781,7 @@
 </p:sld>
 </file>
 
-<file path=ppt/slides/slide29.xml><?xml version="1.0" encoding="utf-8"?>
+<file path=ppt/slides/slide35.xml><?xml version="1.0" encoding="utf-8"?>
 <p:sld xmlns:a="http://schemas.openxmlformats.org/drawingml/2006/main" xmlns:r="http://schemas.openxmlformats.org/officeDocument/2006/relationships" xmlns:p="http://schemas.openxmlformats.org/presentationml/2006/main">
   <p:cSld>
     <p:spTree>
@@ -14825,114 +16021,7 @@
 </p:sld>
 </file>
 
-<file path=ppt/slides/slide3.xml><?xml version="1.0" encoding="utf-8"?>
-<p:sld xmlns:a="http://schemas.openxmlformats.org/drawingml/2006/main" xmlns:r="http://schemas.openxmlformats.org/officeDocument/2006/relationships" xmlns:p="http://schemas.openxmlformats.org/presentationml/2006/main">
-  <p:cSld>
-    <p:spTree>
-      <p:nvGrpSpPr>
-        <p:cNvPr id="1" name=""/>
-        <p:cNvGrpSpPr/>
-        <p:nvPr/>
-      </p:nvGrpSpPr>
-      <p:grpSpPr>
-        <a:xfrm>
-          <a:off x="0" y="0"/>
-          <a:ext cx="0" cy="0"/>
-          <a:chOff x="0" y="0"/>
-          <a:chExt cx="0" cy="0"/>
-        </a:xfrm>
-      </p:grpSpPr>
-      <p:sp>
-        <p:nvSpPr>
-          <p:cNvPr id="2" name="Content Placeholder 1"/>
-          <p:cNvSpPr>
-            <a:spLocks noGrp="1"/>
-          </p:cNvSpPr>
-          <p:nvPr>
-            <p:ph idx="1"/>
-          </p:nvPr>
-        </p:nvSpPr>
-        <p:spPr/>
-        <p:txBody>
-          <a:bodyPr>
-            <a:normAutofit/>
-          </a:bodyPr>
-          <a:lstStyle/>
-          <a:p>
-            <a:r>
-              <a:rPr lang="en-US" dirty="0"/>
-              <a:t>A virus encodes one or more </a:t>
-            </a:r>
-            <a:r>
-              <a:rPr lang="en-US" b="1" dirty="0"/>
-              <a:t>proteases</a:t>
-            </a:r>
-            <a:r>
-              <a:rPr lang="en-US" dirty="0"/>
-              <a:t> which are enzymes that spur the formation of new protein products, thus play crucial roles in virus </a:t>
-            </a:r>
-            <a:r>
-              <a:rPr lang="en-US" dirty="0" smtClean="0"/>
-              <a:t>replication</a:t>
-            </a:r>
-          </a:p>
-          <a:p>
-            <a:r>
-              <a:rPr lang="en-US" b="1" dirty="0"/>
-              <a:t>proteases </a:t>
-            </a:r>
-            <a:r>
-              <a:rPr lang="en-US" dirty="0" smtClean="0"/>
-              <a:t>are </a:t>
-            </a:r>
-            <a:r>
-              <a:rPr lang="en-US" dirty="0"/>
-              <a:t>important targets for the design and development of potent antiviral agents or </a:t>
-            </a:r>
-            <a:r>
-              <a:rPr lang="en-US" b="1" dirty="0" smtClean="0"/>
-              <a:t>drugs</a:t>
-            </a:r>
-          </a:p>
-        </p:txBody>
-      </p:sp>
-      <p:sp>
-        <p:nvSpPr>
-          <p:cNvPr id="3" name="Title 2"/>
-          <p:cNvSpPr>
-            <a:spLocks noGrp="1"/>
-          </p:cNvSpPr>
-          <p:nvPr>
-            <p:ph type="title"/>
-          </p:nvPr>
-        </p:nvSpPr>
-        <p:spPr/>
-        <p:txBody>
-          <a:bodyPr/>
-          <a:lstStyle/>
-          <a:p>
-            <a:r>
-              <a:rPr lang="en-US" dirty="0" smtClean="0"/>
-              <a:t>Introduction</a:t>
-            </a:r>
-            <a:endParaRPr lang="en-US" dirty="0"/>
-          </a:p>
-        </p:txBody>
-      </p:sp>
-    </p:spTree>
-    <p:extLst>
-      <p:ext uri="{BB962C8B-B14F-4D97-AF65-F5344CB8AC3E}">
-        <p14:creationId xmlns:p14="http://schemas.microsoft.com/office/powerpoint/2010/main" val="1428778530"/>
-      </p:ext>
-    </p:extLst>
-  </p:cSld>
-  <p:clrMapOvr>
-    <a:masterClrMapping/>
-  </p:clrMapOvr>
-</p:sld>
-</file>
-
-<file path=ppt/slides/slide30.xml><?xml version="1.0" encoding="utf-8"?>
+<file path=ppt/slides/slide36.xml><?xml version="1.0" encoding="utf-8"?>
 <p:sld xmlns:a="http://schemas.openxmlformats.org/drawingml/2006/main" xmlns:r="http://schemas.openxmlformats.org/officeDocument/2006/relationships" xmlns:p="http://schemas.openxmlformats.org/presentationml/2006/main">
   <p:cSld>
     <p:spTree>
@@ -15172,7 +16261,7 @@
 </p:sld>
 </file>
 
-<file path=ppt/slides/slide31.xml><?xml version="1.0" encoding="utf-8"?>
+<file path=ppt/slides/slide37.xml><?xml version="1.0" encoding="utf-8"?>
 <p:sld xmlns:a="http://schemas.openxmlformats.org/drawingml/2006/main" xmlns:r="http://schemas.openxmlformats.org/officeDocument/2006/relationships" xmlns:p="http://schemas.openxmlformats.org/presentationml/2006/main">
   <p:cSld>
     <p:spTree>
@@ -15253,8 +16342,8 @@
               <a:t>model with </a:t>
             </a:r>
             <a:r>
-              <a:rPr lang="en-US" b="1" dirty="0" err="1" smtClean="0"/>
-              <a:t>kiba</a:t>
+              <a:rPr lang="en-US" b="1" dirty="0" smtClean="0"/>
+              <a:t>URV</a:t>
             </a:r>
             <a:r>
               <a:rPr lang="en-US" dirty="0" smtClean="0"/>
@@ -15412,7 +16501,7 @@
 </p:sld>
 </file>
 
-<file path=ppt/slides/slide32.xml><?xml version="1.0" encoding="utf-8"?>
+<file path=ppt/slides/slide38.xml><?xml version="1.0" encoding="utf-8"?>
 <p:sld xmlns:a="http://schemas.openxmlformats.org/drawingml/2006/main" xmlns:r="http://schemas.openxmlformats.org/officeDocument/2006/relationships" xmlns:p="http://schemas.openxmlformats.org/presentationml/2006/main">
   <p:cSld>
     <p:spTree>
@@ -15493,8 +16582,8 @@
               <a:t>model with </a:t>
             </a:r>
             <a:r>
-              <a:rPr lang="en-US" b="1" dirty="0" err="1" smtClean="0"/>
-              <a:t>kiba</a:t>
+              <a:rPr lang="en-US" b="1" dirty="0" smtClean="0"/>
+              <a:t>URV</a:t>
             </a:r>
             <a:r>
               <a:rPr lang="en-US" dirty="0" smtClean="0"/>
@@ -15652,7 +16741,7 @@
 </p:sld>
 </file>
 
-<file path=ppt/slides/slide33.xml><?xml version="1.0" encoding="utf-8"?>
+<file path=ppt/slides/slide39.xml><?xml version="1.0" encoding="utf-8"?>
 <p:sld xmlns:a="http://schemas.openxmlformats.org/drawingml/2006/main" xmlns:r="http://schemas.openxmlformats.org/officeDocument/2006/relationships" xmlns:p="http://schemas.openxmlformats.org/presentationml/2006/main">
   <p:cSld>
     <p:spTree>
@@ -17114,115 +18203,6 @@
 </p:sld>
 </file>
 
-<file path=ppt/slides/slide34.xml><?xml version="1.0" encoding="utf-8"?>
-<p:sld xmlns:a="http://schemas.openxmlformats.org/drawingml/2006/main" xmlns:r="http://schemas.openxmlformats.org/officeDocument/2006/relationships" xmlns:p="http://schemas.openxmlformats.org/presentationml/2006/main">
-  <p:cSld>
-    <p:spTree>
-      <p:nvGrpSpPr>
-        <p:cNvPr id="1" name=""/>
-        <p:cNvGrpSpPr/>
-        <p:nvPr/>
-      </p:nvGrpSpPr>
-      <p:grpSpPr>
-        <a:xfrm>
-          <a:off x="0" y="0"/>
-          <a:ext cx="0" cy="0"/>
-          <a:chOff x="0" y="0"/>
-          <a:chExt cx="0" cy="0"/>
-        </a:xfrm>
-      </p:grpSpPr>
-      <p:sp>
-        <p:nvSpPr>
-          <p:cNvPr id="2" name="Content Placeholder 1"/>
-          <p:cNvSpPr>
-            <a:spLocks noGrp="1"/>
-          </p:cNvSpPr>
-          <p:nvPr>
-            <p:ph idx="1"/>
-          </p:nvPr>
-        </p:nvSpPr>
-        <p:spPr/>
-        <p:txBody>
-          <a:bodyPr/>
-          <a:lstStyle/>
-          <a:p>
-            <a:r>
-              <a:rPr lang="en-US" sz="2800" dirty="0"/>
-              <a:t>the sample size of the data including train and test sets is largest in </a:t>
-            </a:r>
-            <a:r>
-              <a:rPr lang="en-US" sz="2800" dirty="0" err="1"/>
-              <a:t>kiba</a:t>
-            </a:r>
-            <a:r>
-              <a:rPr lang="en-US" sz="2800" dirty="0"/>
-              <a:t> then </a:t>
-            </a:r>
-            <a:r>
-              <a:rPr lang="en-US" sz="2800" dirty="0" err="1"/>
-              <a:t>davis</a:t>
-            </a:r>
-            <a:r>
-              <a:rPr lang="en-US" sz="2800" dirty="0"/>
-              <a:t> followed by </a:t>
-            </a:r>
-            <a:r>
-              <a:rPr lang="en-US" sz="2800" dirty="0" smtClean="0"/>
-              <a:t>URV.</a:t>
-            </a:r>
-          </a:p>
-          <a:p>
-            <a:r>
-              <a:rPr lang="en-US" sz="2800" dirty="0" err="1"/>
-              <a:t>kiba</a:t>
-            </a:r>
-            <a:r>
-              <a:rPr lang="en-US" sz="2800" dirty="0"/>
-              <a:t> dataset has the best diversity specially for the target proteins as it integrates different bioactivity scores</a:t>
-            </a:r>
-            <a:endParaRPr lang="en-US" sz="2800" dirty="0" smtClean="0"/>
-          </a:p>
-          <a:p>
-            <a:endParaRPr lang="en-US" dirty="0"/>
-          </a:p>
-        </p:txBody>
-      </p:sp>
-      <p:sp>
-        <p:nvSpPr>
-          <p:cNvPr id="3" name="Title 2"/>
-          <p:cNvSpPr>
-            <a:spLocks noGrp="1"/>
-          </p:cNvSpPr>
-          <p:nvPr>
-            <p:ph type="title"/>
-          </p:nvPr>
-        </p:nvSpPr>
-        <p:spPr/>
-        <p:txBody>
-          <a:bodyPr/>
-          <a:lstStyle/>
-          <a:p>
-            <a:r>
-              <a:rPr lang="en-US" dirty="0" smtClean="0"/>
-              <a:t>Conclusion</a:t>
-            </a:r>
-            <a:endParaRPr lang="en-US" dirty="0"/>
-          </a:p>
-        </p:txBody>
-      </p:sp>
-    </p:spTree>
-    <p:extLst>
-      <p:ext uri="{BB962C8B-B14F-4D97-AF65-F5344CB8AC3E}">
-        <p14:creationId xmlns:p14="http://schemas.microsoft.com/office/powerpoint/2010/main" val="3106270336"/>
-      </p:ext>
-    </p:extLst>
-  </p:cSld>
-  <p:clrMapOvr>
-    <a:masterClrMapping/>
-  </p:clrMapOvr>
-</p:sld>
-</file>
-
 <file path=ppt/slides/slide4.xml><?xml version="1.0" encoding="utf-8"?>
 <p:sld xmlns:a="http://schemas.openxmlformats.org/drawingml/2006/main" xmlns:r="http://schemas.openxmlformats.org/officeDocument/2006/relationships" xmlns:p="http://schemas.openxmlformats.org/presentationml/2006/main">
   <p:cSld>
@@ -17303,6 +18283,115 @@
     <p:extLst>
       <p:ext uri="{BB962C8B-B14F-4D97-AF65-F5344CB8AC3E}">
         <p14:creationId xmlns:p14="http://schemas.microsoft.com/office/powerpoint/2010/main" val="3608801134"/>
+      </p:ext>
+    </p:extLst>
+  </p:cSld>
+  <p:clrMapOvr>
+    <a:masterClrMapping/>
+  </p:clrMapOvr>
+</p:sld>
+</file>
+
+<file path=ppt/slides/slide40.xml><?xml version="1.0" encoding="utf-8"?>
+<p:sld xmlns:a="http://schemas.openxmlformats.org/drawingml/2006/main" xmlns:r="http://schemas.openxmlformats.org/officeDocument/2006/relationships" xmlns:p="http://schemas.openxmlformats.org/presentationml/2006/main">
+  <p:cSld>
+    <p:spTree>
+      <p:nvGrpSpPr>
+        <p:cNvPr id="1" name=""/>
+        <p:cNvGrpSpPr/>
+        <p:nvPr/>
+      </p:nvGrpSpPr>
+      <p:grpSpPr>
+        <a:xfrm>
+          <a:off x="0" y="0"/>
+          <a:ext cx="0" cy="0"/>
+          <a:chOff x="0" y="0"/>
+          <a:chExt cx="0" cy="0"/>
+        </a:xfrm>
+      </p:grpSpPr>
+      <p:sp>
+        <p:nvSpPr>
+          <p:cNvPr id="2" name="Content Placeholder 1"/>
+          <p:cNvSpPr>
+            <a:spLocks noGrp="1"/>
+          </p:cNvSpPr>
+          <p:nvPr>
+            <p:ph idx="1"/>
+          </p:nvPr>
+        </p:nvSpPr>
+        <p:spPr/>
+        <p:txBody>
+          <a:bodyPr/>
+          <a:lstStyle/>
+          <a:p>
+            <a:r>
+              <a:rPr lang="en-US" sz="2800" dirty="0"/>
+              <a:t>the sample size of the data including train and test sets is largest in </a:t>
+            </a:r>
+            <a:r>
+              <a:rPr lang="en-US" sz="2800" dirty="0" err="1"/>
+              <a:t>kiba</a:t>
+            </a:r>
+            <a:r>
+              <a:rPr lang="en-US" sz="2800" dirty="0"/>
+              <a:t> then </a:t>
+            </a:r>
+            <a:r>
+              <a:rPr lang="en-US" sz="2800" dirty="0" err="1"/>
+              <a:t>davis</a:t>
+            </a:r>
+            <a:r>
+              <a:rPr lang="en-US" sz="2800" dirty="0"/>
+              <a:t> followed by </a:t>
+            </a:r>
+            <a:r>
+              <a:rPr lang="en-US" sz="2800" dirty="0" smtClean="0"/>
+              <a:t>URV.</a:t>
+            </a:r>
+          </a:p>
+          <a:p>
+            <a:r>
+              <a:rPr lang="en-US" sz="2800" dirty="0" err="1"/>
+              <a:t>kiba</a:t>
+            </a:r>
+            <a:r>
+              <a:rPr lang="en-US" sz="2800" dirty="0"/>
+              <a:t> dataset has the best diversity specially for the target proteins as it integrates different bioactivity scores</a:t>
+            </a:r>
+            <a:endParaRPr lang="en-US" sz="2800" dirty="0" smtClean="0"/>
+          </a:p>
+          <a:p>
+            <a:endParaRPr lang="en-US" dirty="0"/>
+          </a:p>
+        </p:txBody>
+      </p:sp>
+      <p:sp>
+        <p:nvSpPr>
+          <p:cNvPr id="3" name="Title 2"/>
+          <p:cNvSpPr>
+            <a:spLocks noGrp="1"/>
+          </p:cNvSpPr>
+          <p:nvPr>
+            <p:ph type="title"/>
+          </p:nvPr>
+        </p:nvSpPr>
+        <p:spPr/>
+        <p:txBody>
+          <a:bodyPr/>
+          <a:lstStyle/>
+          <a:p>
+            <a:r>
+              <a:rPr lang="en-US" dirty="0" smtClean="0"/>
+              <a:t>Conclusion</a:t>
+            </a:r>
+            <a:endParaRPr lang="en-US" dirty="0"/>
+          </a:p>
+        </p:txBody>
+      </p:sp>
+    </p:spTree>
+    <p:extLst>
+      <p:ext uri="{BB962C8B-B14F-4D97-AF65-F5344CB8AC3E}">
+        <p14:creationId xmlns:p14="http://schemas.microsoft.com/office/powerpoint/2010/main" val="3106270336"/>
       </p:ext>
     </p:extLst>
   </p:cSld>

</xml_diff>

<commit_message>
update presentation with models
</commit_message>
<xml_diff>
--- a/presentation/Drug Target affinity.pptx
+++ b/presentation/Drug Target affinity.pptx
@@ -5,7 +5,7 @@
     <p:sldMasterId id="2147483708" r:id="rId1"/>
   </p:sldMasterIdLst>
   <p:notesMasterIdLst>
-    <p:notesMasterId r:id="rId42"/>
+    <p:notesMasterId r:id="rId47"/>
   </p:notesMasterIdLst>
   <p:sldIdLst>
     <p:sldId id="256" r:id="rId2"/>
@@ -32,22 +32,27 @@
     <p:sldId id="289" r:id="rId23"/>
     <p:sldId id="295" r:id="rId24"/>
     <p:sldId id="296" r:id="rId25"/>
-    <p:sldId id="297" r:id="rId26"/>
-    <p:sldId id="298" r:id="rId27"/>
-    <p:sldId id="274" r:id="rId28"/>
-    <p:sldId id="275" r:id="rId29"/>
-    <p:sldId id="277" r:id="rId30"/>
-    <p:sldId id="276" r:id="rId31"/>
-    <p:sldId id="278" r:id="rId32"/>
-    <p:sldId id="279" r:id="rId33"/>
-    <p:sldId id="281" r:id="rId34"/>
-    <p:sldId id="280" r:id="rId35"/>
-    <p:sldId id="283" r:id="rId36"/>
-    <p:sldId id="284" r:id="rId37"/>
-    <p:sldId id="285" r:id="rId38"/>
-    <p:sldId id="286" r:id="rId39"/>
-    <p:sldId id="282" r:id="rId40"/>
-    <p:sldId id="287" r:id="rId41"/>
+    <p:sldId id="299" r:id="rId26"/>
+    <p:sldId id="300" r:id="rId27"/>
+    <p:sldId id="301" r:id="rId28"/>
+    <p:sldId id="302" r:id="rId29"/>
+    <p:sldId id="303" r:id="rId30"/>
+    <p:sldId id="297" r:id="rId31"/>
+    <p:sldId id="298" r:id="rId32"/>
+    <p:sldId id="274" r:id="rId33"/>
+    <p:sldId id="275" r:id="rId34"/>
+    <p:sldId id="277" r:id="rId35"/>
+    <p:sldId id="276" r:id="rId36"/>
+    <p:sldId id="278" r:id="rId37"/>
+    <p:sldId id="279" r:id="rId38"/>
+    <p:sldId id="281" r:id="rId39"/>
+    <p:sldId id="280" r:id="rId40"/>
+    <p:sldId id="283" r:id="rId41"/>
+    <p:sldId id="284" r:id="rId42"/>
+    <p:sldId id="285" r:id="rId43"/>
+    <p:sldId id="286" r:id="rId44"/>
+    <p:sldId id="282" r:id="rId45"/>
+    <p:sldId id="287" r:id="rId46"/>
   </p:sldIdLst>
   <p:sldSz cx="9144000" cy="6858000" type="screen4x3"/>
   <p:notesSz cx="6858000" cy="9144000"/>
@@ -231,7 +236,7 @@
           <a:p>
             <a:fld id="{8EF0DE39-7A54-47F9-AEA5-5AC06FD683AA}" type="datetimeFigureOut">
               <a:rPr lang="en-US" smtClean="0"/>
-              <a:t>9/4/2024</a:t>
+              <a:t>9/11/2024</a:t>
             </a:fld>
             <a:endParaRPr lang="en-US"/>
           </a:p>
@@ -1759,7 +1764,7 @@
           <a:p>
             <a:fld id="{C7689D65-4FEA-4151-83A2-DE7BE828DF61}" type="slidenum">
               <a:rPr lang="en-US" smtClean="0"/>
-              <a:t>40</a:t>
+              <a:t>45</a:t>
             </a:fld>
             <a:endParaRPr lang="en-US"/>
           </a:p>
@@ -5572,7 +5577,7 @@
             <a:fld id="{1D8BD707-D9CF-40AE-B4C6-C98DA3205C09}" type="datetimeFigureOut">
               <a:rPr lang="en-US" smtClean="0"/>
               <a:pPr/>
-              <a:t>9/4/2024</a:t>
+              <a:t>9/11/2024</a:t>
             </a:fld>
             <a:endParaRPr lang="en-US"/>
           </a:p>
@@ -5770,7 +5775,7 @@
             <a:fld id="{1D8BD707-D9CF-40AE-B4C6-C98DA3205C09}" type="datetimeFigureOut">
               <a:rPr lang="en-US" smtClean="0"/>
               <a:pPr/>
-              <a:t>9/4/2024</a:t>
+              <a:t>9/11/2024</a:t>
             </a:fld>
             <a:endParaRPr lang="en-US"/>
           </a:p>
@@ -5957,7 +5962,7 @@
             <a:fld id="{1D8BD707-D9CF-40AE-B4C6-C98DA3205C09}" type="datetimeFigureOut">
               <a:rPr lang="en-US" smtClean="0"/>
               <a:pPr/>
-              <a:t>9/4/2024</a:t>
+              <a:t>9/11/2024</a:t>
             </a:fld>
             <a:endParaRPr lang="en-US"/>
           </a:p>
@@ -6109,7 +6114,7 @@
             <a:fld id="{1D8BD707-D9CF-40AE-B4C6-C98DA3205C09}" type="datetimeFigureOut">
               <a:rPr lang="en-US" smtClean="0"/>
               <a:pPr/>
-              <a:t>9/4/2024</a:t>
+              <a:t>9/11/2024</a:t>
             </a:fld>
             <a:endParaRPr lang="en-US"/>
           </a:p>
@@ -6366,7 +6371,7 @@
             <a:fld id="{1D8BD707-D9CF-40AE-B4C6-C98DA3205C09}" type="datetimeFigureOut">
               <a:rPr lang="en-US" smtClean="0"/>
               <a:pPr/>
-              <a:t>9/4/2024</a:t>
+              <a:t>9/11/2024</a:t>
             </a:fld>
             <a:endParaRPr lang="en-US"/>
           </a:p>
@@ -6777,7 +6782,7 @@
             <a:fld id="{1D8BD707-D9CF-40AE-B4C6-C98DA3205C09}" type="datetimeFigureOut">
               <a:rPr lang="en-US" smtClean="0"/>
               <a:pPr/>
-              <a:t>9/4/2024</a:t>
+              <a:t>9/11/2024</a:t>
             </a:fld>
             <a:endParaRPr lang="en-US"/>
           </a:p>
@@ -7225,7 +7230,7 @@
             <a:fld id="{1D8BD707-D9CF-40AE-B4C6-C98DA3205C09}" type="datetimeFigureOut">
               <a:rPr lang="en-US" smtClean="0"/>
               <a:pPr/>
-              <a:t>9/4/2024</a:t>
+              <a:t>9/11/2024</a:t>
             </a:fld>
             <a:endParaRPr lang="en-US"/>
           </a:p>
@@ -7328,7 +7333,7 @@
             <a:fld id="{1D8BD707-D9CF-40AE-B4C6-C98DA3205C09}" type="datetimeFigureOut">
               <a:rPr lang="en-US" smtClean="0"/>
               <a:pPr/>
-              <a:t>9/4/2024</a:t>
+              <a:t>9/11/2024</a:t>
             </a:fld>
             <a:endParaRPr lang="en-US"/>
           </a:p>
@@ -7451,7 +7456,7 @@
             <a:fld id="{1D8BD707-D9CF-40AE-B4C6-C98DA3205C09}" type="datetimeFigureOut">
               <a:rPr lang="en-US" smtClean="0"/>
               <a:pPr/>
-              <a:t>9/4/2024</a:t>
+              <a:t>9/11/2024</a:t>
             </a:fld>
             <a:endParaRPr lang="en-US"/>
           </a:p>
@@ -7727,7 +7732,7 @@
             <a:fld id="{1D8BD707-D9CF-40AE-B4C6-C98DA3205C09}" type="datetimeFigureOut">
               <a:rPr lang="en-US" smtClean="0"/>
               <a:pPr/>
-              <a:t>9/4/2024</a:t>
+              <a:t>9/11/2024</a:t>
             </a:fld>
             <a:endParaRPr lang="en-US"/>
           </a:p>
@@ -7934,7 +7939,7 @@
             <a:fld id="{1D8BD707-D9CF-40AE-B4C6-C98DA3205C09}" type="datetimeFigureOut">
               <a:rPr lang="en-US" smtClean="0"/>
               <a:pPr/>
-              <a:t>9/4/2024</a:t>
+              <a:t>9/11/2024</a:t>
             </a:fld>
             <a:endParaRPr lang="en-US"/>
           </a:p>
@@ -9045,7 +9050,7 @@
             <a:fld id="{1D8BD707-D9CF-40AE-B4C6-C98DA3205C09}" type="datetimeFigureOut">
               <a:rPr lang="en-US" smtClean="0"/>
               <a:pPr/>
-              <a:t>9/4/2024</a:t>
+              <a:t>9/11/2024</a:t>
             </a:fld>
             <a:endParaRPr lang="en-US"/>
           </a:p>
@@ -13311,7 +13316,7 @@
         </p:blipFill>
         <p:spPr>
           <a:xfrm>
-            <a:off x="6934200" y="4538339"/>
+            <a:off x="304800" y="2802569"/>
             <a:ext cx="2133600" cy="2107353"/>
           </a:xfrm>
           <a:prstGeom prst="rect">
@@ -13327,7 +13332,7 @@
         </p:nvSpPr>
         <p:spPr>
           <a:xfrm>
-            <a:off x="7315200" y="5410200"/>
+            <a:off x="685800" y="3674430"/>
             <a:ext cx="838200" cy="539307"/>
           </a:xfrm>
           <a:prstGeom prst="rect">
@@ -13367,7 +13372,7 @@
       </p:sp>
       <p:pic>
         <p:nvPicPr>
-          <p:cNvPr id="7" name="Picture 6"/>
+          <p:cNvPr id="8" name="Picture 7"/>
           <p:cNvPicPr>
             <a:picLocks noChangeAspect="1"/>
           </p:cNvPicPr>
@@ -13387,8 +13392,8 @@
         </p:blipFill>
         <p:spPr>
           <a:xfrm>
-            <a:off x="2438400" y="1295400"/>
-            <a:ext cx="4300297" cy="5105401"/>
+            <a:off x="4267200" y="211975"/>
+            <a:ext cx="4739096" cy="6629400"/>
           </a:xfrm>
           <a:prstGeom prst="rect">
             <a:avLst/>
@@ -13416,6 +13421,1424 @@
 </file>
 
 <file path=ppt/slides/slide25.xml><?xml version="1.0" encoding="utf-8"?>
+<p:sld xmlns:a="http://schemas.openxmlformats.org/drawingml/2006/main" xmlns:r="http://schemas.openxmlformats.org/officeDocument/2006/relationships" xmlns:p="http://schemas.openxmlformats.org/presentationml/2006/main">
+  <p:cSld>
+    <p:spTree>
+      <p:nvGrpSpPr>
+        <p:cNvPr id="1" name=""/>
+        <p:cNvGrpSpPr/>
+        <p:nvPr/>
+      </p:nvGrpSpPr>
+      <p:grpSpPr>
+        <a:xfrm>
+          <a:off x="0" y="0"/>
+          <a:ext cx="0" cy="0"/>
+          <a:chOff x="0" y="0"/>
+          <a:chExt cx="0" cy="0"/>
+        </a:xfrm>
+      </p:grpSpPr>
+      <p:sp>
+        <p:nvSpPr>
+          <p:cNvPr id="2" name="Content Placeholder 1"/>
+          <p:cNvSpPr>
+            <a:spLocks noGrp="1"/>
+          </p:cNvSpPr>
+          <p:nvPr>
+            <p:ph idx="1"/>
+          </p:nvPr>
+        </p:nvSpPr>
+        <p:spPr>
+          <a:xfrm>
+            <a:off x="0" y="685800"/>
+            <a:ext cx="9144000" cy="6172200"/>
+          </a:xfrm>
+        </p:spPr>
+        <p:txBody>
+          <a:bodyPr>
+            <a:noAutofit/>
+          </a:bodyPr>
+          <a:lstStyle/>
+          <a:p>
+            <a:r>
+              <a:rPr lang="en-US" dirty="0" smtClean="0"/>
+              <a:t>Graph attention layer(GAT) layer</a:t>
+            </a:r>
+          </a:p>
+          <a:p>
+            <a:pPr lvl="1"/>
+            <a:r>
+              <a:rPr lang="en-US" sz="1600" dirty="0" smtClean="0"/>
+              <a:t>graph attention Layer from the </a:t>
+            </a:r>
+            <a:r>
+              <a:rPr lang="en-US" sz="1600" dirty="0">
+                <a:hlinkClick r:id="rId2"/>
+              </a:rPr>
+              <a:t>“</a:t>
+            </a:r>
+            <a:r>
+              <a:rPr lang="en-US" sz="1600" dirty="0">
+                <a:hlinkClick r:id="rId3"/>
+              </a:rPr>
+              <a:t>Graph Attention Networks</a:t>
+            </a:r>
+            <a:r>
+              <a:rPr lang="en-US" sz="1600" dirty="0">
+                <a:hlinkClick r:id="rId2"/>
+              </a:rPr>
+              <a:t>”</a:t>
+            </a:r>
+            <a:r>
+              <a:rPr lang="en-US" sz="1600" dirty="0" smtClean="0"/>
+              <a:t> paper in 2018.</a:t>
+            </a:r>
+          </a:p>
+          <a:p>
+            <a:pPr lvl="1"/>
+            <a:r>
+              <a:rPr lang="en-US" sz="1600" dirty="0" smtClean="0"/>
+              <a:t>Implemented in </a:t>
+            </a:r>
+            <a:r>
+              <a:rPr lang="en-US" sz="1600" dirty="0" err="1" smtClean="0"/>
+              <a:t>torch_geometric</a:t>
+            </a:r>
+            <a:r>
+              <a:rPr lang="en-US" sz="1600" dirty="0" smtClean="0"/>
+              <a:t> as </a:t>
+            </a:r>
+            <a:r>
+              <a:rPr lang="en-US" sz="1600" b="1" dirty="0" err="1" smtClean="0"/>
+              <a:t>GATConv</a:t>
+            </a:r>
+            <a:endParaRPr lang="en-US" sz="1600" b="1" dirty="0" smtClean="0"/>
+          </a:p>
+          <a:p>
+            <a:pPr lvl="1"/>
+            <a:endParaRPr lang="en-US" b="1" dirty="0"/>
+          </a:p>
+          <a:p>
+            <a:pPr lvl="1"/>
+            <a:endParaRPr lang="en-US" b="1" dirty="0" smtClean="0"/>
+          </a:p>
+          <a:p>
+            <a:pPr lvl="1"/>
+            <a:endParaRPr lang="en-US" b="1" dirty="0"/>
+          </a:p>
+          <a:p>
+            <a:pPr lvl="1"/>
+            <a:endParaRPr lang="en-US" b="1" dirty="0" smtClean="0"/>
+          </a:p>
+          <a:p>
+            <a:pPr lvl="1"/>
+            <a:endParaRPr lang="en-US" b="1" dirty="0" smtClean="0"/>
+          </a:p>
+          <a:p>
+            <a:pPr lvl="1"/>
+            <a:endParaRPr lang="en-US" b="1" dirty="0" smtClean="0"/>
+          </a:p>
+          <a:p>
+            <a:pPr lvl="4"/>
+            <a:endParaRPr lang="en-US" b="1" dirty="0" smtClean="0"/>
+          </a:p>
+          <a:p>
+            <a:pPr lvl="2"/>
+            <a:r>
+              <a:rPr lang="en-US" sz="1800" b="1" dirty="0"/>
+              <a:t>A</a:t>
+            </a:r>
+            <a:r>
+              <a:rPr lang="en-US" sz="1800" dirty="0"/>
+              <a:t> : adjacency matrix </a:t>
+            </a:r>
+            <a:r>
+              <a:rPr lang="en-US" sz="1800" b="1" dirty="0"/>
+              <a:t>N * N</a:t>
+            </a:r>
+          </a:p>
+          <a:p>
+            <a:pPr lvl="2"/>
+            <a:r>
+              <a:rPr lang="en-US" sz="1800" b="1" dirty="0"/>
+              <a:t>X</a:t>
+            </a:r>
+            <a:r>
+              <a:rPr lang="en-US" sz="1800" dirty="0"/>
+              <a:t> : is node feature matrix </a:t>
+            </a:r>
+            <a:r>
+              <a:rPr lang="en-US" sz="1800" b="1" dirty="0"/>
+              <a:t>N * C</a:t>
+            </a:r>
+          </a:p>
+          <a:p>
+            <a:pPr lvl="2"/>
+            <a:r>
+              <a:rPr lang="en-US" sz="1800" b="1" dirty="0"/>
+              <a:t>H : </a:t>
+            </a:r>
+            <a:r>
+              <a:rPr lang="en-US" sz="1800" dirty="0"/>
+              <a:t>transformed feature matrix </a:t>
+            </a:r>
+            <a:r>
+              <a:rPr lang="en-US" sz="1800" b="1" dirty="0"/>
+              <a:t>N * F</a:t>
+            </a:r>
+          </a:p>
+          <a:p>
+            <a:pPr lvl="2"/>
+            <a:r>
+              <a:rPr lang="en-US" sz="1800" b="1" dirty="0"/>
+              <a:t>W: </a:t>
+            </a:r>
+            <a:r>
+              <a:rPr lang="en-US" sz="1800" dirty="0"/>
+              <a:t>weight matrix of current head </a:t>
+            </a:r>
+            <a:r>
+              <a:rPr lang="en-US" sz="1800" b="1" dirty="0"/>
+              <a:t>C * F</a:t>
+            </a:r>
+          </a:p>
+          <a:p>
+            <a:pPr lvl="2"/>
+            <a:r>
+              <a:rPr lang="en-US" sz="1800" b="1" dirty="0"/>
+              <a:t>a : </a:t>
+            </a:r>
+            <a:r>
+              <a:rPr lang="en-US" sz="1800" dirty="0"/>
+              <a:t>attention vector of current head </a:t>
+            </a:r>
+            <a:r>
+              <a:rPr lang="en-US" sz="1800" b="1" dirty="0"/>
+              <a:t>2 * F</a:t>
+            </a:r>
+          </a:p>
+          <a:p>
+            <a:pPr lvl="2"/>
+            <a:r>
+              <a:rPr lang="en-US" sz="1800" b="1" dirty="0"/>
+              <a:t>E : </a:t>
+            </a:r>
+            <a:r>
+              <a:rPr lang="en-US" sz="1800" dirty="0"/>
+              <a:t>attention score matrix </a:t>
+            </a:r>
+            <a:r>
+              <a:rPr lang="en-US" sz="1800" b="1" dirty="0"/>
+              <a:t>N * N</a:t>
+            </a:r>
+          </a:p>
+          <a:p>
+            <a:pPr lvl="2"/>
+            <a:r>
+              <a:rPr lang="en-US" sz="1800" b="1" dirty="0"/>
+              <a:t>Z : </a:t>
+            </a:r>
+            <a:r>
+              <a:rPr lang="en-US" sz="1800" dirty="0"/>
+              <a:t>Final Output Feature Matrix </a:t>
+            </a:r>
+            <a:r>
+              <a:rPr lang="en-US" sz="1800" b="1" dirty="0"/>
+              <a:t>N * F * h</a:t>
+            </a:r>
+          </a:p>
+          <a:p>
+            <a:pPr lvl="1"/>
+            <a:endParaRPr lang="en-US" b="1" dirty="0" smtClean="0"/>
+          </a:p>
+          <a:p>
+            <a:pPr lvl="1"/>
+            <a:endParaRPr lang="en-US" dirty="0"/>
+          </a:p>
+          <a:p>
+            <a:pPr lvl="1"/>
+            <a:endParaRPr lang="en-US" b="1" dirty="0" smtClean="0"/>
+          </a:p>
+          <a:p>
+            <a:pPr lvl="1"/>
+            <a:endParaRPr lang="en-US" b="1" dirty="0"/>
+          </a:p>
+          <a:p>
+            <a:pPr lvl="2"/>
+            <a:endParaRPr lang="en-US" dirty="0" smtClean="0"/>
+          </a:p>
+          <a:p>
+            <a:pPr lvl="2"/>
+            <a:endParaRPr lang="en-US" dirty="0"/>
+          </a:p>
+          <a:p>
+            <a:pPr lvl="2"/>
+            <a:endParaRPr lang="en-US" dirty="0" smtClean="0"/>
+          </a:p>
+          <a:p>
+            <a:pPr lvl="2"/>
+            <a:endParaRPr lang="en-US" dirty="0" smtClean="0"/>
+          </a:p>
+          <a:p>
+            <a:pPr marL="630936" lvl="2" indent="0">
+              <a:buNone/>
+            </a:pPr>
+            <a:r>
+              <a:rPr lang="en-US" dirty="0" smtClean="0"/>
+              <a:t/>
+            </a:r>
+            <a:br>
+              <a:rPr lang="en-US" dirty="0" smtClean="0"/>
+            </a:br>
+            <a:endParaRPr lang="en-US" dirty="0"/>
+          </a:p>
+        </p:txBody>
+      </p:sp>
+      <p:sp>
+        <p:nvSpPr>
+          <p:cNvPr id="3" name="Title 2"/>
+          <p:cNvSpPr>
+            <a:spLocks noGrp="1"/>
+          </p:cNvSpPr>
+          <p:nvPr>
+            <p:ph type="title"/>
+          </p:nvPr>
+        </p:nvSpPr>
+        <p:spPr>
+          <a:xfrm>
+            <a:off x="586394" y="152400"/>
+            <a:ext cx="8229600" cy="563562"/>
+          </a:xfrm>
+        </p:spPr>
+        <p:txBody>
+          <a:bodyPr>
+            <a:normAutofit fontScale="90000"/>
+          </a:bodyPr>
+          <a:lstStyle/>
+          <a:p>
+            <a:r>
+              <a:rPr lang="en-US" dirty="0" smtClean="0"/>
+              <a:t>Drug Branch</a:t>
+            </a:r>
+            <a:endParaRPr lang="en-US" dirty="0"/>
+          </a:p>
+        </p:txBody>
+      </p:sp>
+      <p:pic>
+        <p:nvPicPr>
+          <p:cNvPr id="6" name="Picture 5"/>
+          <p:cNvPicPr>
+            <a:picLocks noChangeAspect="1"/>
+          </p:cNvPicPr>
+          <p:nvPr/>
+        </p:nvPicPr>
+        <p:blipFill>
+          <a:blip r:embed="rId4">
+            <a:extLst>
+              <a:ext uri="{28A0092B-C50C-407E-A947-70E740481C1C}">
+                <a14:useLocalDpi xmlns:a14="http://schemas.microsoft.com/office/drawing/2010/main" val="0"/>
+              </a:ext>
+            </a:extLst>
+          </a:blip>
+          <a:stretch>
+            <a:fillRect/>
+          </a:stretch>
+        </p:blipFill>
+        <p:spPr>
+          <a:xfrm>
+            <a:off x="457200" y="1905000"/>
+            <a:ext cx="8077200" cy="2692536"/>
+          </a:xfrm>
+          <a:prstGeom prst="rect">
+            <a:avLst/>
+          </a:prstGeom>
+        </p:spPr>
+      </p:pic>
+    </p:spTree>
+    <p:extLst>
+      <p:ext uri="{BB962C8B-B14F-4D97-AF65-F5344CB8AC3E}">
+        <p14:creationId xmlns:p14="http://schemas.microsoft.com/office/powerpoint/2010/main" val="1804637024"/>
+      </p:ext>
+    </p:extLst>
+  </p:cSld>
+  <p:clrMapOvr>
+    <a:masterClrMapping/>
+  </p:clrMapOvr>
+  <p:timing>
+    <p:tnLst>
+      <p:par>
+        <p:cTn id="1" dur="indefinite" restart="never" nodeType="tmRoot"/>
+      </p:par>
+    </p:tnLst>
+  </p:timing>
+</p:sld>
+</file>
+
+<file path=ppt/slides/slide26.xml><?xml version="1.0" encoding="utf-8"?>
+<p:sld xmlns:a="http://schemas.openxmlformats.org/drawingml/2006/main" xmlns:r="http://schemas.openxmlformats.org/officeDocument/2006/relationships" xmlns:p="http://schemas.openxmlformats.org/presentationml/2006/main">
+  <p:cSld>
+    <p:spTree>
+      <p:nvGrpSpPr>
+        <p:cNvPr id="1" name=""/>
+        <p:cNvGrpSpPr/>
+        <p:nvPr/>
+      </p:nvGrpSpPr>
+      <p:grpSpPr>
+        <a:xfrm>
+          <a:off x="0" y="0"/>
+          <a:ext cx="0" cy="0"/>
+          <a:chOff x="0" y="0"/>
+          <a:chExt cx="0" cy="0"/>
+        </a:xfrm>
+      </p:grpSpPr>
+      <p:sp>
+        <p:nvSpPr>
+          <p:cNvPr id="2" name="Content Placeholder 1"/>
+          <p:cNvSpPr>
+            <a:spLocks noGrp="1"/>
+          </p:cNvSpPr>
+          <p:nvPr>
+            <p:ph idx="1"/>
+          </p:nvPr>
+        </p:nvSpPr>
+        <p:spPr>
+          <a:xfrm>
+            <a:off x="457200" y="838200"/>
+            <a:ext cx="8458200" cy="5867400"/>
+          </a:xfrm>
+        </p:spPr>
+        <p:txBody>
+          <a:bodyPr/>
+          <a:lstStyle/>
+          <a:p>
+            <a:r>
+              <a:rPr lang="en-US" dirty="0" smtClean="0"/>
+              <a:t>GAT-based </a:t>
+            </a:r>
+            <a:r>
+              <a:rPr lang="en-US" dirty="0"/>
+              <a:t>model</a:t>
+            </a:r>
+          </a:p>
+          <a:p>
+            <a:pPr lvl="1"/>
+            <a:endParaRPr lang="en-US" dirty="0"/>
+          </a:p>
+        </p:txBody>
+      </p:sp>
+      <p:sp>
+        <p:nvSpPr>
+          <p:cNvPr id="3" name="Title 2"/>
+          <p:cNvSpPr>
+            <a:spLocks noGrp="1"/>
+          </p:cNvSpPr>
+          <p:nvPr>
+            <p:ph type="title"/>
+          </p:nvPr>
+        </p:nvSpPr>
+        <p:spPr>
+          <a:xfrm>
+            <a:off x="457200" y="274638"/>
+            <a:ext cx="8229600" cy="563562"/>
+          </a:xfrm>
+        </p:spPr>
+        <p:txBody>
+          <a:bodyPr>
+            <a:normAutofit fontScale="90000"/>
+          </a:bodyPr>
+          <a:lstStyle/>
+          <a:p>
+            <a:r>
+              <a:rPr lang="en-US" dirty="0"/>
+              <a:t>Drug Branch</a:t>
+            </a:r>
+          </a:p>
+        </p:txBody>
+      </p:sp>
+      <p:pic>
+        <p:nvPicPr>
+          <p:cNvPr id="4" name="Picture 3"/>
+          <p:cNvPicPr>
+            <a:picLocks noChangeAspect="1"/>
+          </p:cNvPicPr>
+          <p:nvPr/>
+        </p:nvPicPr>
+        <p:blipFill>
+          <a:blip r:embed="rId2" cstate="print">
+            <a:extLst>
+              <a:ext uri="{28A0092B-C50C-407E-A947-70E740481C1C}">
+                <a14:useLocalDpi xmlns:a14="http://schemas.microsoft.com/office/drawing/2010/main" val="0"/>
+              </a:ext>
+            </a:extLst>
+          </a:blip>
+          <a:stretch>
+            <a:fillRect/>
+          </a:stretch>
+        </p:blipFill>
+        <p:spPr>
+          <a:xfrm>
+            <a:off x="609600" y="3484662"/>
+            <a:ext cx="2590800" cy="2558929"/>
+          </a:xfrm>
+          <a:prstGeom prst="rect">
+            <a:avLst/>
+          </a:prstGeom>
+        </p:spPr>
+      </p:pic>
+      <p:sp>
+        <p:nvSpPr>
+          <p:cNvPr id="6" name="Rectangle 5"/>
+          <p:cNvSpPr/>
+          <p:nvPr/>
+        </p:nvSpPr>
+        <p:spPr>
+          <a:xfrm>
+            <a:off x="1066800" y="4626176"/>
+            <a:ext cx="990600" cy="539307"/>
+          </a:xfrm>
+          <a:prstGeom prst="rect">
+            <a:avLst/>
+          </a:prstGeom>
+          <a:noFill/>
+          <a:ln>
+            <a:solidFill>
+              <a:srgbClr val="FF0000"/>
+            </a:solidFill>
+          </a:ln>
+        </p:spPr>
+        <p:style>
+          <a:lnRef idx="2">
+            <a:schemeClr val="accent1">
+              <a:shade val="50000"/>
+            </a:schemeClr>
+          </a:lnRef>
+          <a:fillRef idx="1">
+            <a:schemeClr val="accent1"/>
+          </a:fillRef>
+          <a:effectRef idx="0">
+            <a:schemeClr val="accent1"/>
+          </a:effectRef>
+          <a:fontRef idx="minor">
+            <a:schemeClr val="lt1"/>
+          </a:fontRef>
+        </p:style>
+        <p:txBody>
+          <a:bodyPr rtlCol="0" anchor="ctr"/>
+          <a:lstStyle/>
+          <a:p>
+            <a:pPr algn="ctr"/>
+            <a:endParaRPr lang="en-US"/>
+          </a:p>
+        </p:txBody>
+      </p:sp>
+      <p:pic>
+        <p:nvPicPr>
+          <p:cNvPr id="8" name="Picture 7"/>
+          <p:cNvPicPr>
+            <a:picLocks noChangeAspect="1"/>
+          </p:cNvPicPr>
+          <p:nvPr/>
+        </p:nvPicPr>
+        <p:blipFill>
+          <a:blip r:embed="rId3">
+            <a:extLst>
+              <a:ext uri="{28A0092B-C50C-407E-A947-70E740481C1C}">
+                <a14:useLocalDpi xmlns:a14="http://schemas.microsoft.com/office/drawing/2010/main" val="0"/>
+              </a:ext>
+            </a:extLst>
+          </a:blip>
+          <a:stretch>
+            <a:fillRect/>
+          </a:stretch>
+        </p:blipFill>
+        <p:spPr>
+          <a:xfrm>
+            <a:off x="4800600" y="76891"/>
+            <a:ext cx="4097595" cy="6685656"/>
+          </a:xfrm>
+          <a:prstGeom prst="rect">
+            <a:avLst/>
+          </a:prstGeom>
+        </p:spPr>
+      </p:pic>
+    </p:spTree>
+    <p:extLst>
+      <p:ext uri="{BB962C8B-B14F-4D97-AF65-F5344CB8AC3E}">
+        <p14:creationId xmlns:p14="http://schemas.microsoft.com/office/powerpoint/2010/main" val="813527468"/>
+      </p:ext>
+    </p:extLst>
+  </p:cSld>
+  <p:clrMapOvr>
+    <a:masterClrMapping/>
+  </p:clrMapOvr>
+  <p:timing>
+    <p:tnLst>
+      <p:par>
+        <p:cTn id="1" dur="indefinite" restart="never" nodeType="tmRoot"/>
+      </p:par>
+    </p:tnLst>
+  </p:timing>
+</p:sld>
+</file>
+
+<file path=ppt/slides/slide27.xml><?xml version="1.0" encoding="utf-8"?>
+<p:sld xmlns:a="http://schemas.openxmlformats.org/drawingml/2006/main" xmlns:r="http://schemas.openxmlformats.org/officeDocument/2006/relationships" xmlns:p="http://schemas.openxmlformats.org/presentationml/2006/main">
+  <p:cSld>
+    <p:spTree>
+      <p:nvGrpSpPr>
+        <p:cNvPr id="1" name=""/>
+        <p:cNvGrpSpPr/>
+        <p:nvPr/>
+      </p:nvGrpSpPr>
+      <p:grpSpPr>
+        <a:xfrm>
+          <a:off x="0" y="0"/>
+          <a:ext cx="0" cy="0"/>
+          <a:chOff x="0" y="0"/>
+          <a:chExt cx="0" cy="0"/>
+        </a:xfrm>
+      </p:grpSpPr>
+      <p:sp>
+        <p:nvSpPr>
+          <p:cNvPr id="2" name="Content Placeholder 1"/>
+          <p:cNvSpPr>
+            <a:spLocks noGrp="1"/>
+          </p:cNvSpPr>
+          <p:nvPr>
+            <p:ph idx="1"/>
+          </p:nvPr>
+        </p:nvSpPr>
+        <p:spPr>
+          <a:xfrm>
+            <a:off x="457200" y="838200"/>
+            <a:ext cx="8458200" cy="5867400"/>
+          </a:xfrm>
+        </p:spPr>
+        <p:txBody>
+          <a:bodyPr/>
+          <a:lstStyle/>
+          <a:p>
+            <a:r>
+              <a:rPr lang="en-US" dirty="0" smtClean="0"/>
+              <a:t>GAT GCN-based </a:t>
+            </a:r>
+            <a:r>
+              <a:rPr lang="en-US" dirty="0"/>
+              <a:t>model</a:t>
+            </a:r>
+          </a:p>
+          <a:p>
+            <a:pPr lvl="1"/>
+            <a:endParaRPr lang="en-US" dirty="0"/>
+          </a:p>
+        </p:txBody>
+      </p:sp>
+      <p:sp>
+        <p:nvSpPr>
+          <p:cNvPr id="3" name="Title 2"/>
+          <p:cNvSpPr>
+            <a:spLocks noGrp="1"/>
+          </p:cNvSpPr>
+          <p:nvPr>
+            <p:ph type="title"/>
+          </p:nvPr>
+        </p:nvSpPr>
+        <p:spPr>
+          <a:xfrm>
+            <a:off x="457200" y="274638"/>
+            <a:ext cx="8229600" cy="563562"/>
+          </a:xfrm>
+        </p:spPr>
+        <p:txBody>
+          <a:bodyPr>
+            <a:normAutofit fontScale="90000"/>
+          </a:bodyPr>
+          <a:lstStyle/>
+          <a:p>
+            <a:r>
+              <a:rPr lang="en-US" dirty="0"/>
+              <a:t>Drug Branch</a:t>
+            </a:r>
+          </a:p>
+        </p:txBody>
+      </p:sp>
+      <p:pic>
+        <p:nvPicPr>
+          <p:cNvPr id="4" name="Picture 3"/>
+          <p:cNvPicPr>
+            <a:picLocks noChangeAspect="1"/>
+          </p:cNvPicPr>
+          <p:nvPr/>
+        </p:nvPicPr>
+        <p:blipFill>
+          <a:blip r:embed="rId2" cstate="print">
+            <a:extLst>
+              <a:ext uri="{28A0092B-C50C-407E-A947-70E740481C1C}">
+                <a14:useLocalDpi xmlns:a14="http://schemas.microsoft.com/office/drawing/2010/main" val="0"/>
+              </a:ext>
+            </a:extLst>
+          </a:blip>
+          <a:stretch>
+            <a:fillRect/>
+          </a:stretch>
+        </p:blipFill>
+        <p:spPr>
+          <a:xfrm>
+            <a:off x="473827" y="2624781"/>
+            <a:ext cx="3048000" cy="3010504"/>
+          </a:xfrm>
+          <a:prstGeom prst="rect">
+            <a:avLst/>
+          </a:prstGeom>
+        </p:spPr>
+      </p:pic>
+      <p:pic>
+        <p:nvPicPr>
+          <p:cNvPr id="7" name="Picture 6"/>
+          <p:cNvPicPr>
+            <a:picLocks noChangeAspect="1"/>
+          </p:cNvPicPr>
+          <p:nvPr/>
+        </p:nvPicPr>
+        <p:blipFill>
+          <a:blip r:embed="rId3">
+            <a:extLst>
+              <a:ext uri="{28A0092B-C50C-407E-A947-70E740481C1C}">
+                <a14:useLocalDpi xmlns:a14="http://schemas.microsoft.com/office/drawing/2010/main" val="0"/>
+              </a:ext>
+            </a:extLst>
+          </a:blip>
+          <a:stretch>
+            <a:fillRect/>
+          </a:stretch>
+        </p:blipFill>
+        <p:spPr>
+          <a:xfrm>
+            <a:off x="5334000" y="461066"/>
+            <a:ext cx="3548194" cy="6315482"/>
+          </a:xfrm>
+          <a:prstGeom prst="rect">
+            <a:avLst/>
+          </a:prstGeom>
+        </p:spPr>
+      </p:pic>
+      <p:sp>
+        <p:nvSpPr>
+          <p:cNvPr id="8" name="Rectangle 7"/>
+          <p:cNvSpPr/>
+          <p:nvPr/>
+        </p:nvSpPr>
+        <p:spPr>
+          <a:xfrm>
+            <a:off x="1028700" y="3962400"/>
+            <a:ext cx="1104900" cy="685800"/>
+          </a:xfrm>
+          <a:prstGeom prst="rect">
+            <a:avLst/>
+          </a:prstGeom>
+          <a:noFill/>
+          <a:ln>
+            <a:solidFill>
+              <a:srgbClr val="FF0000"/>
+            </a:solidFill>
+          </a:ln>
+        </p:spPr>
+        <p:style>
+          <a:lnRef idx="2">
+            <a:schemeClr val="accent1">
+              <a:shade val="50000"/>
+            </a:schemeClr>
+          </a:lnRef>
+          <a:fillRef idx="1">
+            <a:schemeClr val="accent1"/>
+          </a:fillRef>
+          <a:effectRef idx="0">
+            <a:schemeClr val="accent1"/>
+          </a:effectRef>
+          <a:fontRef idx="minor">
+            <a:schemeClr val="lt1"/>
+          </a:fontRef>
+        </p:style>
+        <p:txBody>
+          <a:bodyPr rtlCol="0" anchor="ctr"/>
+          <a:lstStyle/>
+          <a:p>
+            <a:pPr algn="ctr"/>
+            <a:endParaRPr lang="en-US"/>
+          </a:p>
+        </p:txBody>
+      </p:sp>
+    </p:spTree>
+    <p:extLst>
+      <p:ext uri="{BB962C8B-B14F-4D97-AF65-F5344CB8AC3E}">
+        <p14:creationId xmlns:p14="http://schemas.microsoft.com/office/powerpoint/2010/main" val="525145471"/>
+      </p:ext>
+    </p:extLst>
+  </p:cSld>
+  <p:clrMapOvr>
+    <a:masterClrMapping/>
+  </p:clrMapOvr>
+  <p:timing>
+    <p:tnLst>
+      <p:par>
+        <p:cTn id="1" dur="indefinite" restart="never" nodeType="tmRoot"/>
+      </p:par>
+    </p:tnLst>
+  </p:timing>
+</p:sld>
+</file>
+
+<file path=ppt/slides/slide28.xml><?xml version="1.0" encoding="utf-8"?>
+<p:sld xmlns:a="http://schemas.openxmlformats.org/drawingml/2006/main" xmlns:r="http://schemas.openxmlformats.org/officeDocument/2006/relationships" xmlns:p="http://schemas.openxmlformats.org/presentationml/2006/main">
+  <p:cSld>
+    <p:spTree>
+      <p:nvGrpSpPr>
+        <p:cNvPr id="1" name=""/>
+        <p:cNvGrpSpPr/>
+        <p:nvPr/>
+      </p:nvGrpSpPr>
+      <p:grpSpPr>
+        <a:xfrm>
+          <a:off x="0" y="0"/>
+          <a:ext cx="0" cy="0"/>
+          <a:chOff x="0" y="0"/>
+          <a:chExt cx="0" cy="0"/>
+        </a:xfrm>
+      </p:grpSpPr>
+      <p:sp>
+        <p:nvSpPr>
+          <p:cNvPr id="2" name="Content Placeholder 1"/>
+          <p:cNvSpPr>
+            <a:spLocks noGrp="1"/>
+          </p:cNvSpPr>
+          <p:nvPr>
+            <p:ph idx="1"/>
+          </p:nvPr>
+        </p:nvSpPr>
+        <p:spPr>
+          <a:xfrm>
+            <a:off x="0" y="685800"/>
+            <a:ext cx="9144000" cy="6172200"/>
+          </a:xfrm>
+        </p:spPr>
+        <p:txBody>
+          <a:bodyPr>
+            <a:noAutofit/>
+          </a:bodyPr>
+          <a:lstStyle/>
+          <a:p>
+            <a:r>
+              <a:rPr lang="en-US" dirty="0" smtClean="0"/>
+              <a:t>Graph </a:t>
+            </a:r>
+            <a:r>
+              <a:rPr lang="en-US" dirty="0" smtClean="0"/>
+              <a:t>isomorphic network(GIN) </a:t>
+            </a:r>
+            <a:r>
+              <a:rPr lang="en-US" dirty="0" smtClean="0"/>
+              <a:t>layer</a:t>
+            </a:r>
+          </a:p>
+          <a:p>
+            <a:pPr lvl="1"/>
+            <a:r>
+              <a:rPr lang="en-US" sz="1600" dirty="0" smtClean="0"/>
+              <a:t>graph attention Layer from the </a:t>
+            </a:r>
+            <a:r>
+              <a:rPr lang="en-US" sz="1600" dirty="0">
+                <a:hlinkClick r:id="rId2"/>
+              </a:rPr>
+              <a:t>“How Powerful are Graph Neural Networks?”</a:t>
+            </a:r>
+            <a:r>
+              <a:rPr lang="en-US" sz="1600" dirty="0" smtClean="0"/>
+              <a:t> paper in </a:t>
+            </a:r>
+            <a:r>
+              <a:rPr lang="en-US" sz="1600" dirty="0" smtClean="0"/>
+              <a:t>2019.</a:t>
+            </a:r>
+            <a:endParaRPr lang="en-US" sz="1600" dirty="0" smtClean="0"/>
+          </a:p>
+          <a:p>
+            <a:pPr lvl="1"/>
+            <a:r>
+              <a:rPr lang="en-US" sz="1600" dirty="0" smtClean="0"/>
+              <a:t>Implemented in </a:t>
+            </a:r>
+            <a:r>
+              <a:rPr lang="en-US" sz="1600" dirty="0" err="1" smtClean="0"/>
+              <a:t>torch_geometric</a:t>
+            </a:r>
+            <a:r>
+              <a:rPr lang="en-US" sz="1600" dirty="0" smtClean="0"/>
+              <a:t> as </a:t>
+            </a:r>
+            <a:r>
+              <a:rPr lang="en-US" sz="1600" b="1" dirty="0" err="1" smtClean="0"/>
+              <a:t>GINConv</a:t>
+            </a:r>
+            <a:endParaRPr lang="en-US" sz="1600" b="1" dirty="0" smtClean="0"/>
+          </a:p>
+          <a:p>
+            <a:pPr lvl="1"/>
+            <a:endParaRPr lang="en-US" b="1" dirty="0"/>
+          </a:p>
+          <a:p>
+            <a:pPr lvl="1"/>
+            <a:endParaRPr lang="en-US" b="1" dirty="0" smtClean="0"/>
+          </a:p>
+          <a:p>
+            <a:pPr lvl="1"/>
+            <a:endParaRPr lang="en-US" b="1" dirty="0"/>
+          </a:p>
+          <a:p>
+            <a:pPr lvl="1"/>
+            <a:endParaRPr lang="en-US" b="1" dirty="0" smtClean="0"/>
+          </a:p>
+          <a:p>
+            <a:pPr lvl="1"/>
+            <a:endParaRPr lang="en-US" b="1" dirty="0" smtClean="0"/>
+          </a:p>
+          <a:p>
+            <a:pPr lvl="1"/>
+            <a:endParaRPr lang="en-US" b="1" dirty="0" smtClean="0"/>
+          </a:p>
+          <a:p>
+            <a:pPr lvl="4"/>
+            <a:endParaRPr lang="en-US" b="1" dirty="0" smtClean="0"/>
+          </a:p>
+          <a:p>
+            <a:pPr lvl="2"/>
+            <a:r>
+              <a:rPr lang="en-US" sz="1800" b="1" dirty="0"/>
+              <a:t>A</a:t>
+            </a:r>
+            <a:r>
+              <a:rPr lang="en-US" sz="1800" dirty="0"/>
+              <a:t> : adjacency matrix </a:t>
+            </a:r>
+            <a:r>
+              <a:rPr lang="en-US" sz="1800" b="1" dirty="0"/>
+              <a:t>N * N</a:t>
+            </a:r>
+          </a:p>
+          <a:p>
+            <a:pPr lvl="2"/>
+            <a:r>
+              <a:rPr lang="en-US" sz="1800" b="1" dirty="0"/>
+              <a:t>X</a:t>
+            </a:r>
+            <a:r>
+              <a:rPr lang="en-US" sz="1800" dirty="0"/>
+              <a:t> : is node feature matrix </a:t>
+            </a:r>
+            <a:r>
+              <a:rPr lang="en-US" sz="1800" b="1" dirty="0"/>
+              <a:t>N * </a:t>
+            </a:r>
+            <a:r>
+              <a:rPr lang="en-US" sz="1800" b="1" dirty="0" smtClean="0"/>
+              <a:t>C</a:t>
+            </a:r>
+          </a:p>
+          <a:p>
+            <a:pPr lvl="2"/>
+            <a:r>
+              <a:rPr lang="en-US" sz="1800" b="1" dirty="0" smtClean="0"/>
+              <a:t>Z </a:t>
+            </a:r>
+            <a:r>
+              <a:rPr lang="en-US" sz="1800" b="1" dirty="0"/>
+              <a:t>: </a:t>
+            </a:r>
+            <a:r>
+              <a:rPr lang="en-US" sz="1800" dirty="0"/>
+              <a:t>Final Output Feature Matrix </a:t>
+            </a:r>
+            <a:r>
+              <a:rPr lang="en-US" sz="1800" b="1" dirty="0"/>
+              <a:t>N * </a:t>
+            </a:r>
+            <a:r>
+              <a:rPr lang="en-US" sz="1800" b="1" dirty="0" smtClean="0"/>
+              <a:t>F</a:t>
+            </a:r>
+            <a:endParaRPr lang="en-US" b="1" dirty="0" smtClean="0"/>
+          </a:p>
+          <a:p>
+            <a:pPr lvl="1"/>
+            <a:endParaRPr lang="en-US" dirty="0"/>
+          </a:p>
+          <a:p>
+            <a:pPr lvl="1"/>
+            <a:endParaRPr lang="en-US" b="1" dirty="0" smtClean="0"/>
+          </a:p>
+          <a:p>
+            <a:pPr lvl="1"/>
+            <a:endParaRPr lang="en-US" b="1" dirty="0"/>
+          </a:p>
+          <a:p>
+            <a:pPr lvl="2"/>
+            <a:endParaRPr lang="en-US" dirty="0" smtClean="0"/>
+          </a:p>
+          <a:p>
+            <a:pPr lvl="2"/>
+            <a:endParaRPr lang="en-US" dirty="0"/>
+          </a:p>
+          <a:p>
+            <a:pPr lvl="2"/>
+            <a:endParaRPr lang="en-US" dirty="0" smtClean="0"/>
+          </a:p>
+          <a:p>
+            <a:pPr lvl="2"/>
+            <a:endParaRPr lang="en-US" dirty="0" smtClean="0"/>
+          </a:p>
+          <a:p>
+            <a:pPr marL="630936" lvl="2" indent="0">
+              <a:buNone/>
+            </a:pPr>
+            <a:r>
+              <a:rPr lang="en-US" dirty="0" smtClean="0"/>
+              <a:t/>
+            </a:r>
+            <a:br>
+              <a:rPr lang="en-US" dirty="0" smtClean="0"/>
+            </a:br>
+            <a:endParaRPr lang="en-US" dirty="0"/>
+          </a:p>
+        </p:txBody>
+      </p:sp>
+      <p:sp>
+        <p:nvSpPr>
+          <p:cNvPr id="3" name="Title 2"/>
+          <p:cNvSpPr>
+            <a:spLocks noGrp="1"/>
+          </p:cNvSpPr>
+          <p:nvPr>
+            <p:ph type="title"/>
+          </p:nvPr>
+        </p:nvSpPr>
+        <p:spPr>
+          <a:xfrm>
+            <a:off x="586394" y="152400"/>
+            <a:ext cx="8229600" cy="563562"/>
+          </a:xfrm>
+        </p:spPr>
+        <p:txBody>
+          <a:bodyPr>
+            <a:normAutofit fontScale="90000"/>
+          </a:bodyPr>
+          <a:lstStyle/>
+          <a:p>
+            <a:r>
+              <a:rPr lang="en-US" dirty="0" smtClean="0"/>
+              <a:t>Drug Branch</a:t>
+            </a:r>
+            <a:endParaRPr lang="en-US" dirty="0"/>
+          </a:p>
+        </p:txBody>
+      </p:sp>
+      <p:pic>
+        <p:nvPicPr>
+          <p:cNvPr id="1026" name="Picture 2"/>
+          <p:cNvPicPr>
+            <a:picLocks noChangeAspect="1" noChangeArrowheads="1"/>
+          </p:cNvPicPr>
+          <p:nvPr/>
+        </p:nvPicPr>
+        <p:blipFill>
+          <a:blip r:embed="rId3">
+            <a:extLst>
+              <a:ext uri="{28A0092B-C50C-407E-A947-70E740481C1C}">
+                <a14:useLocalDpi xmlns:a14="http://schemas.microsoft.com/office/drawing/2010/main" val="0"/>
+              </a:ext>
+            </a:extLst>
+          </a:blip>
+          <a:srcRect/>
+          <a:stretch>
+            <a:fillRect/>
+          </a:stretch>
+        </p:blipFill>
+        <p:spPr bwMode="auto">
+          <a:xfrm>
+            <a:off x="119149" y="1910542"/>
+            <a:ext cx="8991600" cy="2580198"/>
+          </a:xfrm>
+          <a:prstGeom prst="rect">
+            <a:avLst/>
+          </a:prstGeom>
+          <a:noFill/>
+          <a:ln>
+            <a:noFill/>
+          </a:ln>
+          <a:effectLst/>
+          <a:extLst>
+            <a:ext uri="{909E8E84-426E-40DD-AFC4-6F175D3DCCD1}">
+              <a14:hiddenFill xmlns:a14="http://schemas.microsoft.com/office/drawing/2010/main">
+                <a:solidFill>
+                  <a:schemeClr val="accent1"/>
+                </a:solidFill>
+              </a14:hiddenFill>
+            </a:ext>
+            <a:ext uri="{91240B29-F687-4F45-9708-019B960494DF}">
+              <a14:hiddenLine xmlns:a14="http://schemas.microsoft.com/office/drawing/2010/main" w="9525">
+                <a:solidFill>
+                  <a:schemeClr val="tx1"/>
+                </a:solidFill>
+                <a:miter lim="800000"/>
+                <a:headEnd/>
+                <a:tailEnd/>
+              </a14:hiddenLine>
+            </a:ext>
+            <a:ext uri="{AF507438-7753-43E0-B8FC-AC1667EBCBE1}">
+              <a14:hiddenEffects xmlns:a14="http://schemas.microsoft.com/office/drawing/2010/main">
+                <a:effectLst>
+                  <a:outerShdw dist="35921" dir="2700000" algn="ctr" rotWithShape="0">
+                    <a:schemeClr val="bg2"/>
+                  </a:outerShdw>
+                </a:effectLst>
+              </a14:hiddenEffects>
+            </a:ext>
+          </a:extLst>
+        </p:spPr>
+      </p:pic>
+    </p:spTree>
+    <p:extLst>
+      <p:ext uri="{BB962C8B-B14F-4D97-AF65-F5344CB8AC3E}">
+        <p14:creationId xmlns:p14="http://schemas.microsoft.com/office/powerpoint/2010/main" val="3959654449"/>
+      </p:ext>
+    </p:extLst>
+  </p:cSld>
+  <p:clrMapOvr>
+    <a:masterClrMapping/>
+  </p:clrMapOvr>
+  <p:timing>
+    <p:tnLst>
+      <p:par>
+        <p:cTn id="1" dur="indefinite" restart="never" nodeType="tmRoot"/>
+      </p:par>
+    </p:tnLst>
+  </p:timing>
+</p:sld>
+</file>
+
+<file path=ppt/slides/slide29.xml><?xml version="1.0" encoding="utf-8"?>
+<p:sld xmlns:a="http://schemas.openxmlformats.org/drawingml/2006/main" xmlns:r="http://schemas.openxmlformats.org/officeDocument/2006/relationships" xmlns:p="http://schemas.openxmlformats.org/presentationml/2006/main">
+  <p:cSld>
+    <p:spTree>
+      <p:nvGrpSpPr>
+        <p:cNvPr id="1" name=""/>
+        <p:cNvGrpSpPr/>
+        <p:nvPr/>
+      </p:nvGrpSpPr>
+      <p:grpSpPr>
+        <a:xfrm>
+          <a:off x="0" y="0"/>
+          <a:ext cx="0" cy="0"/>
+          <a:chOff x="0" y="0"/>
+          <a:chExt cx="0" cy="0"/>
+        </a:xfrm>
+      </p:grpSpPr>
+      <p:sp>
+        <p:nvSpPr>
+          <p:cNvPr id="2" name="Content Placeholder 1"/>
+          <p:cNvSpPr>
+            <a:spLocks noGrp="1"/>
+          </p:cNvSpPr>
+          <p:nvPr>
+            <p:ph idx="1"/>
+          </p:nvPr>
+        </p:nvSpPr>
+        <p:spPr>
+          <a:xfrm>
+            <a:off x="457200" y="838200"/>
+            <a:ext cx="8458200" cy="5867400"/>
+          </a:xfrm>
+        </p:spPr>
+        <p:txBody>
+          <a:bodyPr/>
+          <a:lstStyle/>
+          <a:p>
+            <a:r>
+              <a:rPr lang="en-US" dirty="0" smtClean="0"/>
+              <a:t>GIN-based </a:t>
+            </a:r>
+            <a:r>
+              <a:rPr lang="en-US" dirty="0"/>
+              <a:t>model</a:t>
+            </a:r>
+          </a:p>
+          <a:p>
+            <a:pPr lvl="1"/>
+            <a:endParaRPr lang="en-US" dirty="0"/>
+          </a:p>
+        </p:txBody>
+      </p:sp>
+      <p:sp>
+        <p:nvSpPr>
+          <p:cNvPr id="3" name="Title 2"/>
+          <p:cNvSpPr>
+            <a:spLocks noGrp="1"/>
+          </p:cNvSpPr>
+          <p:nvPr>
+            <p:ph type="title"/>
+          </p:nvPr>
+        </p:nvSpPr>
+        <p:spPr>
+          <a:xfrm>
+            <a:off x="457200" y="274638"/>
+            <a:ext cx="8229600" cy="563562"/>
+          </a:xfrm>
+        </p:spPr>
+        <p:txBody>
+          <a:bodyPr>
+            <a:normAutofit fontScale="90000"/>
+          </a:bodyPr>
+          <a:lstStyle/>
+          <a:p>
+            <a:r>
+              <a:rPr lang="en-US" dirty="0"/>
+              <a:t>Drug Branch</a:t>
+            </a:r>
+          </a:p>
+        </p:txBody>
+      </p:sp>
+      <p:pic>
+        <p:nvPicPr>
+          <p:cNvPr id="4" name="Picture 3"/>
+          <p:cNvPicPr>
+            <a:picLocks noChangeAspect="1"/>
+          </p:cNvPicPr>
+          <p:nvPr/>
+        </p:nvPicPr>
+        <p:blipFill>
+          <a:blip r:embed="rId2" cstate="print">
+            <a:extLst>
+              <a:ext uri="{28A0092B-C50C-407E-A947-70E740481C1C}">
+                <a14:useLocalDpi xmlns:a14="http://schemas.microsoft.com/office/drawing/2010/main" val="0"/>
+              </a:ext>
+            </a:extLst>
+          </a:blip>
+          <a:stretch>
+            <a:fillRect/>
+          </a:stretch>
+        </p:blipFill>
+        <p:spPr>
+          <a:xfrm>
+            <a:off x="473827" y="2624781"/>
+            <a:ext cx="3048000" cy="3010504"/>
+          </a:xfrm>
+          <a:prstGeom prst="rect">
+            <a:avLst/>
+          </a:prstGeom>
+        </p:spPr>
+      </p:pic>
+      <p:sp>
+        <p:nvSpPr>
+          <p:cNvPr id="8" name="Rectangle 7"/>
+          <p:cNvSpPr/>
+          <p:nvPr/>
+        </p:nvSpPr>
+        <p:spPr>
+          <a:xfrm>
+            <a:off x="1028700" y="3962400"/>
+            <a:ext cx="1104900" cy="685800"/>
+          </a:xfrm>
+          <a:prstGeom prst="rect">
+            <a:avLst/>
+          </a:prstGeom>
+          <a:noFill/>
+          <a:ln>
+            <a:solidFill>
+              <a:srgbClr val="FF0000"/>
+            </a:solidFill>
+          </a:ln>
+        </p:spPr>
+        <p:style>
+          <a:lnRef idx="2">
+            <a:schemeClr val="accent1">
+              <a:shade val="50000"/>
+            </a:schemeClr>
+          </a:lnRef>
+          <a:fillRef idx="1">
+            <a:schemeClr val="accent1"/>
+          </a:fillRef>
+          <a:effectRef idx="0">
+            <a:schemeClr val="accent1"/>
+          </a:effectRef>
+          <a:fontRef idx="minor">
+            <a:schemeClr val="lt1"/>
+          </a:fontRef>
+        </p:style>
+        <p:txBody>
+          <a:bodyPr rtlCol="0" anchor="ctr"/>
+          <a:lstStyle/>
+          <a:p>
+            <a:pPr algn="ctr"/>
+            <a:endParaRPr lang="en-US"/>
+          </a:p>
+        </p:txBody>
+      </p:sp>
+      <p:pic>
+        <p:nvPicPr>
+          <p:cNvPr id="5" name="Picture 4"/>
+          <p:cNvPicPr>
+            <a:picLocks noChangeAspect="1"/>
+          </p:cNvPicPr>
+          <p:nvPr/>
+        </p:nvPicPr>
+        <p:blipFill>
+          <a:blip r:embed="rId3">
+            <a:extLst>
+              <a:ext uri="{28A0092B-C50C-407E-A947-70E740481C1C}">
+                <a14:useLocalDpi xmlns:a14="http://schemas.microsoft.com/office/drawing/2010/main" val="0"/>
+              </a:ext>
+            </a:extLst>
+          </a:blip>
+          <a:stretch>
+            <a:fillRect/>
+          </a:stretch>
+        </p:blipFill>
+        <p:spPr>
+          <a:xfrm>
+            <a:off x="5334000" y="23553"/>
+            <a:ext cx="3581400" cy="6858000"/>
+          </a:xfrm>
+          <a:prstGeom prst="rect">
+            <a:avLst/>
+          </a:prstGeom>
+        </p:spPr>
+      </p:pic>
+    </p:spTree>
+    <p:extLst>
+      <p:ext uri="{BB962C8B-B14F-4D97-AF65-F5344CB8AC3E}">
+        <p14:creationId xmlns:p14="http://schemas.microsoft.com/office/powerpoint/2010/main" val="2099308790"/>
+      </p:ext>
+    </p:extLst>
+  </p:cSld>
+  <p:clrMapOvr>
+    <a:masterClrMapping/>
+  </p:clrMapOvr>
+  <p:timing>
+    <p:tnLst>
+      <p:par>
+        <p:cTn id="1" dur="indefinite" restart="never" nodeType="tmRoot"/>
+      </p:par>
+    </p:tnLst>
+  </p:timing>
+</p:sld>
+</file>
+
+<file path=ppt/slides/slide3.xml><?xml version="1.0" encoding="utf-8"?>
+<p:sld xmlns:a="http://schemas.openxmlformats.org/drawingml/2006/main" xmlns:r="http://schemas.openxmlformats.org/officeDocument/2006/relationships" xmlns:p="http://schemas.openxmlformats.org/presentationml/2006/main">
+  <p:cSld>
+    <p:spTree>
+      <p:nvGrpSpPr>
+        <p:cNvPr id="1" name=""/>
+        <p:cNvGrpSpPr/>
+        <p:nvPr/>
+      </p:nvGrpSpPr>
+      <p:grpSpPr>
+        <a:xfrm>
+          <a:off x="0" y="0"/>
+          <a:ext cx="0" cy="0"/>
+          <a:chOff x="0" y="0"/>
+          <a:chExt cx="0" cy="0"/>
+        </a:xfrm>
+      </p:grpSpPr>
+      <p:sp>
+        <p:nvSpPr>
+          <p:cNvPr id="2" name="Content Placeholder 1"/>
+          <p:cNvSpPr>
+            <a:spLocks noGrp="1"/>
+          </p:cNvSpPr>
+          <p:nvPr>
+            <p:ph idx="1"/>
+          </p:nvPr>
+        </p:nvSpPr>
+        <p:spPr/>
+        <p:txBody>
+          <a:bodyPr>
+            <a:normAutofit/>
+          </a:bodyPr>
+          <a:lstStyle/>
+          <a:p>
+            <a:r>
+              <a:rPr lang="en-US" dirty="0"/>
+              <a:t>A virus encodes one or more </a:t>
+            </a:r>
+            <a:r>
+              <a:rPr lang="en-US" b="1" dirty="0"/>
+              <a:t>proteases</a:t>
+            </a:r>
+            <a:r>
+              <a:rPr lang="en-US" dirty="0"/>
+              <a:t> which are enzymes that spur the formation of new protein products, thus play crucial roles in virus </a:t>
+            </a:r>
+            <a:r>
+              <a:rPr lang="en-US" dirty="0" smtClean="0"/>
+              <a:t>replication</a:t>
+            </a:r>
+          </a:p>
+          <a:p>
+            <a:r>
+              <a:rPr lang="en-US" b="1" dirty="0"/>
+              <a:t>proteases </a:t>
+            </a:r>
+            <a:r>
+              <a:rPr lang="en-US" dirty="0" smtClean="0"/>
+              <a:t>are </a:t>
+            </a:r>
+            <a:r>
+              <a:rPr lang="en-US" dirty="0"/>
+              <a:t>important targets for the design and development of potent antiviral agents or </a:t>
+            </a:r>
+            <a:r>
+              <a:rPr lang="en-US" b="1" dirty="0" smtClean="0"/>
+              <a:t>drugs</a:t>
+            </a:r>
+          </a:p>
+        </p:txBody>
+      </p:sp>
+      <p:sp>
+        <p:nvSpPr>
+          <p:cNvPr id="3" name="Title 2"/>
+          <p:cNvSpPr>
+            <a:spLocks noGrp="1"/>
+          </p:cNvSpPr>
+          <p:nvPr>
+            <p:ph type="title"/>
+          </p:nvPr>
+        </p:nvSpPr>
+        <p:spPr/>
+        <p:txBody>
+          <a:bodyPr/>
+          <a:lstStyle/>
+          <a:p>
+            <a:r>
+              <a:rPr lang="en-US" dirty="0" smtClean="0"/>
+              <a:t>Introduction</a:t>
+            </a:r>
+            <a:endParaRPr lang="en-US" dirty="0"/>
+          </a:p>
+        </p:txBody>
+      </p:sp>
+    </p:spTree>
+    <p:extLst>
+      <p:ext uri="{BB962C8B-B14F-4D97-AF65-F5344CB8AC3E}">
+        <p14:creationId xmlns:p14="http://schemas.microsoft.com/office/powerpoint/2010/main" val="1428778530"/>
+      </p:ext>
+    </p:extLst>
+  </p:cSld>
+  <p:clrMapOvr>
+    <a:masterClrMapping/>
+  </p:clrMapOvr>
+</p:sld>
+</file>
+
+<file path=ppt/slides/slide30.xml><?xml version="1.0" encoding="utf-8"?>
 <p:sld xmlns:a="http://schemas.openxmlformats.org/drawingml/2006/main" xmlns:r="http://schemas.openxmlformats.org/officeDocument/2006/relationships" xmlns:p="http://schemas.openxmlformats.org/presentationml/2006/main">
   <p:cSld>
     <p:spTree>
@@ -13577,10 +15000,17 @@
   <p:clrMapOvr>
     <a:masterClrMapping/>
   </p:clrMapOvr>
+  <p:timing>
+    <p:tnLst>
+      <p:par>
+        <p:cTn id="1" dur="indefinite" restart="never" nodeType="tmRoot"/>
+      </p:par>
+    </p:tnLst>
+  </p:timing>
 </p:sld>
 </file>
 
-<file path=ppt/slides/slide26.xml><?xml version="1.0" encoding="utf-8"?>
+<file path=ppt/slides/slide31.xml><?xml version="1.0" encoding="utf-8"?>
 <p:sld xmlns:a="http://schemas.openxmlformats.org/drawingml/2006/main" xmlns:r="http://schemas.openxmlformats.org/officeDocument/2006/relationships" xmlns:p="http://schemas.openxmlformats.org/presentationml/2006/main">
   <p:cSld>
     <p:spTree>
@@ -13637,21 +15067,13 @@
           <a:p>
             <a:r>
               <a:rPr lang="en-US" dirty="0" smtClean="0"/>
-              <a:t>Refactor </a:t>
-            </a:r>
-            <a:r>
-              <a:rPr lang="en-US" dirty="0"/>
-              <a:t>the </a:t>
-            </a:r>
+              <a:t>Refactor and debug the code</a:t>
+            </a:r>
+          </a:p>
+          <a:p>
             <a:r>
               <a:rPr lang="en-US" dirty="0" smtClean="0"/>
-              <a:t>code</a:t>
-            </a:r>
-          </a:p>
-          <a:p>
-            <a:r>
-              <a:rPr lang="en-US" dirty="0" smtClean="0"/>
-              <a:t>Train the given 4 models on 3 datasets </a:t>
+              <a:t>Train the proposed 4 models on 3 datasets </a:t>
             </a:r>
           </a:p>
           <a:p>
@@ -13731,10 +15153,17 @@
   <p:clrMapOvr>
     <a:masterClrMapping/>
   </p:clrMapOvr>
+  <p:timing>
+    <p:tnLst>
+      <p:par>
+        <p:cTn id="1" dur="indefinite" restart="never" nodeType="tmRoot"/>
+      </p:par>
+    </p:tnLst>
+  </p:timing>
 </p:sld>
 </file>
 
-<file path=ppt/slides/slide27.xml><?xml version="1.0" encoding="utf-8"?>
+<file path=ppt/slides/slide32.xml><?xml version="1.0" encoding="utf-8"?>
 <p:sld xmlns:a="http://schemas.openxmlformats.org/drawingml/2006/main" xmlns:r="http://schemas.openxmlformats.org/officeDocument/2006/relationships" xmlns:p="http://schemas.openxmlformats.org/presentationml/2006/main">
   <p:cSld>
     <p:spTree>
@@ -13978,7 +15407,7 @@
 </p:sld>
 </file>
 
-<file path=ppt/slides/slide28.xml><?xml version="1.0" encoding="utf-8"?>
+<file path=ppt/slides/slide33.xml><?xml version="1.0" encoding="utf-8"?>
 <p:sld xmlns:a="http://schemas.openxmlformats.org/drawingml/2006/main" xmlns:r="http://schemas.openxmlformats.org/officeDocument/2006/relationships" xmlns:p="http://schemas.openxmlformats.org/presentationml/2006/main">
   <p:cSld>
     <p:spTree>
@@ -14222,7 +15651,7 @@
 </p:sld>
 </file>
 
-<file path=ppt/slides/slide29.xml><?xml version="1.0" encoding="utf-8"?>
+<file path=ppt/slides/slide34.xml><?xml version="1.0" encoding="utf-8"?>
 <p:sld xmlns:a="http://schemas.openxmlformats.org/drawingml/2006/main" xmlns:r="http://schemas.openxmlformats.org/officeDocument/2006/relationships" xmlns:p="http://schemas.openxmlformats.org/presentationml/2006/main">
   <p:cSld>
     <p:spTree>
@@ -14466,114 +15895,7 @@
 </p:sld>
 </file>
 
-<file path=ppt/slides/slide3.xml><?xml version="1.0" encoding="utf-8"?>
-<p:sld xmlns:a="http://schemas.openxmlformats.org/drawingml/2006/main" xmlns:r="http://schemas.openxmlformats.org/officeDocument/2006/relationships" xmlns:p="http://schemas.openxmlformats.org/presentationml/2006/main">
-  <p:cSld>
-    <p:spTree>
-      <p:nvGrpSpPr>
-        <p:cNvPr id="1" name=""/>
-        <p:cNvGrpSpPr/>
-        <p:nvPr/>
-      </p:nvGrpSpPr>
-      <p:grpSpPr>
-        <a:xfrm>
-          <a:off x="0" y="0"/>
-          <a:ext cx="0" cy="0"/>
-          <a:chOff x="0" y="0"/>
-          <a:chExt cx="0" cy="0"/>
-        </a:xfrm>
-      </p:grpSpPr>
-      <p:sp>
-        <p:nvSpPr>
-          <p:cNvPr id="2" name="Content Placeholder 1"/>
-          <p:cNvSpPr>
-            <a:spLocks noGrp="1"/>
-          </p:cNvSpPr>
-          <p:nvPr>
-            <p:ph idx="1"/>
-          </p:nvPr>
-        </p:nvSpPr>
-        <p:spPr/>
-        <p:txBody>
-          <a:bodyPr>
-            <a:normAutofit/>
-          </a:bodyPr>
-          <a:lstStyle/>
-          <a:p>
-            <a:r>
-              <a:rPr lang="en-US" dirty="0"/>
-              <a:t>A virus encodes one or more </a:t>
-            </a:r>
-            <a:r>
-              <a:rPr lang="en-US" b="1" dirty="0"/>
-              <a:t>proteases</a:t>
-            </a:r>
-            <a:r>
-              <a:rPr lang="en-US" dirty="0"/>
-              <a:t> which are enzymes that spur the formation of new protein products, thus play crucial roles in virus </a:t>
-            </a:r>
-            <a:r>
-              <a:rPr lang="en-US" dirty="0" smtClean="0"/>
-              <a:t>replication</a:t>
-            </a:r>
-          </a:p>
-          <a:p>
-            <a:r>
-              <a:rPr lang="en-US" b="1" dirty="0"/>
-              <a:t>proteases </a:t>
-            </a:r>
-            <a:r>
-              <a:rPr lang="en-US" dirty="0" smtClean="0"/>
-              <a:t>are </a:t>
-            </a:r>
-            <a:r>
-              <a:rPr lang="en-US" dirty="0"/>
-              <a:t>important targets for the design and development of potent antiviral agents or </a:t>
-            </a:r>
-            <a:r>
-              <a:rPr lang="en-US" b="1" dirty="0" smtClean="0"/>
-              <a:t>drugs</a:t>
-            </a:r>
-          </a:p>
-        </p:txBody>
-      </p:sp>
-      <p:sp>
-        <p:nvSpPr>
-          <p:cNvPr id="3" name="Title 2"/>
-          <p:cNvSpPr>
-            <a:spLocks noGrp="1"/>
-          </p:cNvSpPr>
-          <p:nvPr>
-            <p:ph type="title"/>
-          </p:nvPr>
-        </p:nvSpPr>
-        <p:spPr/>
-        <p:txBody>
-          <a:bodyPr/>
-          <a:lstStyle/>
-          <a:p>
-            <a:r>
-              <a:rPr lang="en-US" dirty="0" smtClean="0"/>
-              <a:t>Introduction</a:t>
-            </a:r>
-            <a:endParaRPr lang="en-US" dirty="0"/>
-          </a:p>
-        </p:txBody>
-      </p:sp>
-    </p:spTree>
-    <p:extLst>
-      <p:ext uri="{BB962C8B-B14F-4D97-AF65-F5344CB8AC3E}">
-        <p14:creationId xmlns:p14="http://schemas.microsoft.com/office/powerpoint/2010/main" val="1428778530"/>
-      </p:ext>
-    </p:extLst>
-  </p:cSld>
-  <p:clrMapOvr>
-    <a:masterClrMapping/>
-  </p:clrMapOvr>
-</p:sld>
-</file>
-
-<file path=ppt/slides/slide30.xml><?xml version="1.0" encoding="utf-8"?>
+<file path=ppt/slides/slide35.xml><?xml version="1.0" encoding="utf-8"?>
 <p:sld xmlns:a="http://schemas.openxmlformats.org/drawingml/2006/main" xmlns:r="http://schemas.openxmlformats.org/officeDocument/2006/relationships" xmlns:p="http://schemas.openxmlformats.org/presentationml/2006/main">
   <p:cSld>
     <p:spTree>
@@ -14821,7 +16143,7 @@
 </p:sld>
 </file>
 
-<file path=ppt/slides/slide31.xml><?xml version="1.0" encoding="utf-8"?>
+<file path=ppt/slides/slide36.xml><?xml version="1.0" encoding="utf-8"?>
 <p:sld xmlns:a="http://schemas.openxmlformats.org/drawingml/2006/main" xmlns:r="http://schemas.openxmlformats.org/officeDocument/2006/relationships" xmlns:p="http://schemas.openxmlformats.org/presentationml/2006/main">
   <p:cSld>
     <p:spTree>
@@ -15061,7 +16383,7 @@
 </p:sld>
 </file>
 
-<file path=ppt/slides/slide32.xml><?xml version="1.0" encoding="utf-8"?>
+<file path=ppt/slides/slide37.xml><?xml version="1.0" encoding="utf-8"?>
 <p:sld xmlns:a="http://schemas.openxmlformats.org/drawingml/2006/main" xmlns:r="http://schemas.openxmlformats.org/officeDocument/2006/relationships" xmlns:p="http://schemas.openxmlformats.org/presentationml/2006/main">
   <p:cSld>
     <p:spTree>
@@ -15301,7 +16623,7 @@
 </p:sld>
 </file>
 
-<file path=ppt/slides/slide33.xml><?xml version="1.0" encoding="utf-8"?>
+<file path=ppt/slides/slide38.xml><?xml version="1.0" encoding="utf-8"?>
 <p:sld xmlns:a="http://schemas.openxmlformats.org/drawingml/2006/main" xmlns:r="http://schemas.openxmlformats.org/officeDocument/2006/relationships" xmlns:p="http://schemas.openxmlformats.org/presentationml/2006/main">
   <p:cSld>
     <p:spTree>
@@ -15541,7 +16863,7 @@
 </p:sld>
 </file>
 
-<file path=ppt/slides/slide34.xml><?xml version="1.0" encoding="utf-8"?>
+<file path=ppt/slides/slide39.xml><?xml version="1.0" encoding="utf-8"?>
 <p:sld xmlns:a="http://schemas.openxmlformats.org/drawingml/2006/main" xmlns:r="http://schemas.openxmlformats.org/officeDocument/2006/relationships" xmlns:p="http://schemas.openxmlformats.org/presentationml/2006/main">
   <p:cSld>
     <p:spTree>
@@ -15781,7 +17103,96 @@
 </p:sld>
 </file>
 
-<file path=ppt/slides/slide35.xml><?xml version="1.0" encoding="utf-8"?>
+<file path=ppt/slides/slide4.xml><?xml version="1.0" encoding="utf-8"?>
+<p:sld xmlns:a="http://schemas.openxmlformats.org/drawingml/2006/main" xmlns:r="http://schemas.openxmlformats.org/officeDocument/2006/relationships" xmlns:p="http://schemas.openxmlformats.org/presentationml/2006/main">
+  <p:cSld>
+    <p:spTree>
+      <p:nvGrpSpPr>
+        <p:cNvPr id="1" name=""/>
+        <p:cNvGrpSpPr/>
+        <p:nvPr/>
+      </p:nvGrpSpPr>
+      <p:grpSpPr>
+        <a:xfrm>
+          <a:off x="0" y="0"/>
+          <a:ext cx="0" cy="0"/>
+          <a:chOff x="0" y="0"/>
+          <a:chExt cx="0" cy="0"/>
+        </a:xfrm>
+      </p:grpSpPr>
+      <p:sp>
+        <p:nvSpPr>
+          <p:cNvPr id="2" name="Content Placeholder 1"/>
+          <p:cNvSpPr>
+            <a:spLocks noGrp="1"/>
+          </p:cNvSpPr>
+          <p:nvPr>
+            <p:ph idx="1"/>
+          </p:nvPr>
+        </p:nvSpPr>
+        <p:spPr/>
+        <p:txBody>
+          <a:bodyPr/>
+          <a:lstStyle/>
+          <a:p>
+            <a:r>
+              <a:rPr lang="en-US" b="1" dirty="0"/>
+              <a:t>Binding affinity </a:t>
+            </a:r>
+            <a:r>
+              <a:rPr lang="en-US" dirty="0"/>
+              <a:t>is the strength of the binding interaction between a single </a:t>
+            </a:r>
+            <a:r>
+              <a:rPr lang="en-US" dirty="0" smtClean="0"/>
+              <a:t>molecule </a:t>
+            </a:r>
+            <a:r>
+              <a:rPr lang="en-US" dirty="0"/>
+              <a:t>(e.g., a virus protein) to its ligand or binding partner (e.g., a drug)</a:t>
+            </a:r>
+          </a:p>
+          <a:p>
+            <a:endParaRPr lang="en-US" dirty="0"/>
+          </a:p>
+        </p:txBody>
+      </p:sp>
+      <p:sp>
+        <p:nvSpPr>
+          <p:cNvPr id="3" name="Title 2"/>
+          <p:cNvSpPr>
+            <a:spLocks noGrp="1"/>
+          </p:cNvSpPr>
+          <p:nvPr>
+            <p:ph type="title"/>
+          </p:nvPr>
+        </p:nvSpPr>
+        <p:spPr/>
+        <p:txBody>
+          <a:bodyPr/>
+          <a:lstStyle/>
+          <a:p>
+            <a:r>
+              <a:rPr lang="en-US" dirty="0"/>
+              <a:t>Introduction</a:t>
+            </a:r>
+          </a:p>
+        </p:txBody>
+      </p:sp>
+    </p:spTree>
+    <p:extLst>
+      <p:ext uri="{BB962C8B-B14F-4D97-AF65-F5344CB8AC3E}">
+        <p14:creationId xmlns:p14="http://schemas.microsoft.com/office/powerpoint/2010/main" val="3608801134"/>
+      </p:ext>
+    </p:extLst>
+  </p:cSld>
+  <p:clrMapOvr>
+    <a:masterClrMapping/>
+  </p:clrMapOvr>
+</p:sld>
+</file>
+
+<file path=ppt/slides/slide40.xml><?xml version="1.0" encoding="utf-8"?>
 <p:sld xmlns:a="http://schemas.openxmlformats.org/drawingml/2006/main" xmlns:r="http://schemas.openxmlformats.org/officeDocument/2006/relationships" xmlns:p="http://schemas.openxmlformats.org/presentationml/2006/main">
   <p:cSld>
     <p:spTree>
@@ -16021,7 +17432,7 @@
 </p:sld>
 </file>
 
-<file path=ppt/slides/slide36.xml><?xml version="1.0" encoding="utf-8"?>
+<file path=ppt/slides/slide41.xml><?xml version="1.0" encoding="utf-8"?>
 <p:sld xmlns:a="http://schemas.openxmlformats.org/drawingml/2006/main" xmlns:r="http://schemas.openxmlformats.org/officeDocument/2006/relationships" xmlns:p="http://schemas.openxmlformats.org/presentationml/2006/main">
   <p:cSld>
     <p:spTree>
@@ -16261,7 +17672,7 @@
 </p:sld>
 </file>
 
-<file path=ppt/slides/slide37.xml><?xml version="1.0" encoding="utf-8"?>
+<file path=ppt/slides/slide42.xml><?xml version="1.0" encoding="utf-8"?>
 <p:sld xmlns:a="http://schemas.openxmlformats.org/drawingml/2006/main" xmlns:r="http://schemas.openxmlformats.org/officeDocument/2006/relationships" xmlns:p="http://schemas.openxmlformats.org/presentationml/2006/main">
   <p:cSld>
     <p:spTree>
@@ -16501,7 +17912,7 @@
 </p:sld>
 </file>
 
-<file path=ppt/slides/slide38.xml><?xml version="1.0" encoding="utf-8"?>
+<file path=ppt/slides/slide43.xml><?xml version="1.0" encoding="utf-8"?>
 <p:sld xmlns:a="http://schemas.openxmlformats.org/drawingml/2006/main" xmlns:r="http://schemas.openxmlformats.org/officeDocument/2006/relationships" xmlns:p="http://schemas.openxmlformats.org/presentationml/2006/main">
   <p:cSld>
     <p:spTree>
@@ -16741,7 +18152,7 @@
 </p:sld>
 </file>
 
-<file path=ppt/slides/slide39.xml><?xml version="1.0" encoding="utf-8"?>
+<file path=ppt/slides/slide44.xml><?xml version="1.0" encoding="utf-8"?>
 <p:sld xmlns:a="http://schemas.openxmlformats.org/drawingml/2006/main" xmlns:r="http://schemas.openxmlformats.org/officeDocument/2006/relationships" xmlns:p="http://schemas.openxmlformats.org/presentationml/2006/main">
   <p:cSld>
     <p:spTree>
@@ -18203,96 +19614,7 @@
 </p:sld>
 </file>
 
-<file path=ppt/slides/slide4.xml><?xml version="1.0" encoding="utf-8"?>
-<p:sld xmlns:a="http://schemas.openxmlformats.org/drawingml/2006/main" xmlns:r="http://schemas.openxmlformats.org/officeDocument/2006/relationships" xmlns:p="http://schemas.openxmlformats.org/presentationml/2006/main">
-  <p:cSld>
-    <p:spTree>
-      <p:nvGrpSpPr>
-        <p:cNvPr id="1" name=""/>
-        <p:cNvGrpSpPr/>
-        <p:nvPr/>
-      </p:nvGrpSpPr>
-      <p:grpSpPr>
-        <a:xfrm>
-          <a:off x="0" y="0"/>
-          <a:ext cx="0" cy="0"/>
-          <a:chOff x="0" y="0"/>
-          <a:chExt cx="0" cy="0"/>
-        </a:xfrm>
-      </p:grpSpPr>
-      <p:sp>
-        <p:nvSpPr>
-          <p:cNvPr id="2" name="Content Placeholder 1"/>
-          <p:cNvSpPr>
-            <a:spLocks noGrp="1"/>
-          </p:cNvSpPr>
-          <p:nvPr>
-            <p:ph idx="1"/>
-          </p:nvPr>
-        </p:nvSpPr>
-        <p:spPr/>
-        <p:txBody>
-          <a:bodyPr/>
-          <a:lstStyle/>
-          <a:p>
-            <a:r>
-              <a:rPr lang="en-US" b="1" dirty="0"/>
-              <a:t>Binding affinity </a:t>
-            </a:r>
-            <a:r>
-              <a:rPr lang="en-US" dirty="0"/>
-              <a:t>is the strength of the binding interaction between a single </a:t>
-            </a:r>
-            <a:r>
-              <a:rPr lang="en-US" dirty="0" smtClean="0"/>
-              <a:t>molecule </a:t>
-            </a:r>
-            <a:r>
-              <a:rPr lang="en-US" dirty="0"/>
-              <a:t>(e.g., a virus protein) to its ligand or binding partner (e.g., a drug)</a:t>
-            </a:r>
-          </a:p>
-          <a:p>
-            <a:endParaRPr lang="en-US" dirty="0"/>
-          </a:p>
-        </p:txBody>
-      </p:sp>
-      <p:sp>
-        <p:nvSpPr>
-          <p:cNvPr id="3" name="Title 2"/>
-          <p:cNvSpPr>
-            <a:spLocks noGrp="1"/>
-          </p:cNvSpPr>
-          <p:nvPr>
-            <p:ph type="title"/>
-          </p:nvPr>
-        </p:nvSpPr>
-        <p:spPr/>
-        <p:txBody>
-          <a:bodyPr/>
-          <a:lstStyle/>
-          <a:p>
-            <a:r>
-              <a:rPr lang="en-US" dirty="0"/>
-              <a:t>Introduction</a:t>
-            </a:r>
-          </a:p>
-        </p:txBody>
-      </p:sp>
-    </p:spTree>
-    <p:extLst>
-      <p:ext uri="{BB962C8B-B14F-4D97-AF65-F5344CB8AC3E}">
-        <p14:creationId xmlns:p14="http://schemas.microsoft.com/office/powerpoint/2010/main" val="3608801134"/>
-      </p:ext>
-    </p:extLst>
-  </p:cSld>
-  <p:clrMapOvr>
-    <a:masterClrMapping/>
-  </p:clrMapOvr>
-</p:sld>
-</file>
-
-<file path=ppt/slides/slide40.xml><?xml version="1.0" encoding="utf-8"?>
+<file path=ppt/slides/slide45.xml><?xml version="1.0" encoding="utf-8"?>
 <p:sld xmlns:a="http://schemas.openxmlformats.org/drawingml/2006/main" xmlns:r="http://schemas.openxmlformats.org/officeDocument/2006/relationships" xmlns:p="http://schemas.openxmlformats.org/presentationml/2006/main">
   <p:cSld>
     <p:spTree>

</xml_diff>